<commit_message>
final project fri v2
</commit_message>
<xml_diff>
--- a/final_project.pptx
+++ b/final_project.pptx
@@ -4,12 +4,17 @@
   <p:sldMasterIdLst>
     <p:sldMasterId id="2147483772" r:id="rId1"/>
   </p:sldMasterIdLst>
+  <p:notesMasterIdLst>
+    <p:notesMasterId r:id="rId9"/>
+  </p:notesMasterIdLst>
   <p:sldIdLst>
     <p:sldId id="256" r:id="rId2"/>
-    <p:sldId id="260" r:id="rId3"/>
-    <p:sldId id="257" r:id="rId4"/>
-    <p:sldId id="259" r:id="rId5"/>
-    <p:sldId id="258" r:id="rId6"/>
+    <p:sldId id="257" r:id="rId3"/>
+    <p:sldId id="260" r:id="rId4"/>
+    <p:sldId id="262" r:id="rId5"/>
+    <p:sldId id="261" r:id="rId6"/>
+    <p:sldId id="259" r:id="rId7"/>
+    <p:sldId id="258" r:id="rId8"/>
   </p:sldIdLst>
   <p:sldSz cx="12192000" cy="6858000"/>
   <p:notesSz cx="6858000" cy="9144000"/>
@@ -116,6 +121,2664 @@
 </p:presentation>
 </file>
 
+<file path=ppt/notesMasters/notesMaster1.xml><?xml version="1.0" encoding="utf-8"?>
+<p:notesMaster xmlns:a="http://schemas.openxmlformats.org/drawingml/2006/main" xmlns:r="http://schemas.openxmlformats.org/officeDocument/2006/relationships" xmlns:p="http://schemas.openxmlformats.org/presentationml/2006/main">
+  <p:cSld>
+    <p:bg>
+      <p:bgRef idx="1001">
+        <a:schemeClr val="bg1"/>
+      </p:bgRef>
+    </p:bg>
+    <p:spTree>
+      <p:nvGrpSpPr>
+        <p:cNvPr id="1" name=""/>
+        <p:cNvGrpSpPr/>
+        <p:nvPr/>
+      </p:nvGrpSpPr>
+      <p:grpSpPr>
+        <a:xfrm>
+          <a:off x="0" y="0"/>
+          <a:ext cx="0" cy="0"/>
+          <a:chOff x="0" y="0"/>
+          <a:chExt cx="0" cy="0"/>
+        </a:xfrm>
+      </p:grpSpPr>
+      <p:sp>
+        <p:nvSpPr>
+          <p:cNvPr id="2" name="Header Placeholder 1"/>
+          <p:cNvSpPr>
+            <a:spLocks noGrp="1"/>
+          </p:cNvSpPr>
+          <p:nvPr>
+            <p:ph type="hdr" sz="quarter"/>
+          </p:nvPr>
+        </p:nvSpPr>
+        <p:spPr>
+          <a:xfrm>
+            <a:off x="0" y="0"/>
+            <a:ext cx="2971800" cy="458788"/>
+          </a:xfrm>
+          <a:prstGeom prst="rect">
+            <a:avLst/>
+          </a:prstGeom>
+        </p:spPr>
+        <p:txBody>
+          <a:bodyPr vert="horz" lIns="91440" tIns="45720" rIns="91440" bIns="45720" rtlCol="0"/>
+          <a:lstStyle>
+            <a:lvl1pPr algn="l">
+              <a:defRPr sz="1200"/>
+            </a:lvl1pPr>
+          </a:lstStyle>
+          <a:p>
+            <a:endParaRPr lang="de-DE"/>
+          </a:p>
+        </p:txBody>
+      </p:sp>
+      <p:sp>
+        <p:nvSpPr>
+          <p:cNvPr id="3" name="Date Placeholder 2"/>
+          <p:cNvSpPr>
+            <a:spLocks noGrp="1"/>
+          </p:cNvSpPr>
+          <p:nvPr>
+            <p:ph type="dt" idx="1"/>
+          </p:nvPr>
+        </p:nvSpPr>
+        <p:spPr>
+          <a:xfrm>
+            <a:off x="3884613" y="0"/>
+            <a:ext cx="2971800" cy="458788"/>
+          </a:xfrm>
+          <a:prstGeom prst="rect">
+            <a:avLst/>
+          </a:prstGeom>
+        </p:spPr>
+        <p:txBody>
+          <a:bodyPr vert="horz" lIns="91440" tIns="45720" rIns="91440" bIns="45720" rtlCol="0"/>
+          <a:lstStyle>
+            <a:lvl1pPr algn="r">
+              <a:defRPr sz="1200"/>
+            </a:lvl1pPr>
+          </a:lstStyle>
+          <a:p>
+            <a:fld id="{28EC38F2-E37B-4B80-B07A-E6B2BA51F5F4}" type="datetimeFigureOut">
+              <a:rPr lang="de-DE" smtClean="0"/>
+              <a:t>12.08.2022</a:t>
+            </a:fld>
+            <a:endParaRPr lang="de-DE"/>
+          </a:p>
+        </p:txBody>
+      </p:sp>
+      <p:sp>
+        <p:nvSpPr>
+          <p:cNvPr id="4" name="Slide Image Placeholder 3"/>
+          <p:cNvSpPr>
+            <a:spLocks noGrp="1" noRot="1" noChangeAspect="1"/>
+          </p:cNvSpPr>
+          <p:nvPr>
+            <p:ph type="sldImg" idx="2"/>
+          </p:nvPr>
+        </p:nvSpPr>
+        <p:spPr>
+          <a:xfrm>
+            <a:off x="685800" y="1143000"/>
+            <a:ext cx="5486400" cy="3086100"/>
+          </a:xfrm>
+          <a:prstGeom prst="rect">
+            <a:avLst/>
+          </a:prstGeom>
+          <a:noFill/>
+          <a:ln w="12700">
+            <a:solidFill>
+              <a:prstClr val="black"/>
+            </a:solidFill>
+          </a:ln>
+        </p:spPr>
+        <p:txBody>
+          <a:bodyPr vert="horz" lIns="91440" tIns="45720" rIns="91440" bIns="45720" rtlCol="0" anchor="ctr"/>
+          <a:lstStyle/>
+          <a:p>
+            <a:endParaRPr lang="de-DE"/>
+          </a:p>
+        </p:txBody>
+      </p:sp>
+      <p:sp>
+        <p:nvSpPr>
+          <p:cNvPr id="5" name="Notes Placeholder 4"/>
+          <p:cNvSpPr>
+            <a:spLocks noGrp="1"/>
+          </p:cNvSpPr>
+          <p:nvPr>
+            <p:ph type="body" sz="quarter" idx="3"/>
+          </p:nvPr>
+        </p:nvSpPr>
+        <p:spPr>
+          <a:xfrm>
+            <a:off x="685800" y="4400550"/>
+            <a:ext cx="5486400" cy="3600450"/>
+          </a:xfrm>
+          <a:prstGeom prst="rect">
+            <a:avLst/>
+          </a:prstGeom>
+        </p:spPr>
+        <p:txBody>
+          <a:bodyPr vert="horz" lIns="91440" tIns="45720" rIns="91440" bIns="45720" rtlCol="0"/>
+          <a:lstStyle/>
+          <a:p>
+            <a:pPr lvl="0"/>
+            <a:r>
+              <a:rPr lang="en-US"/>
+              <a:t>Click to edit Master text styles</a:t>
+            </a:r>
+          </a:p>
+          <a:p>
+            <a:pPr lvl="1"/>
+            <a:r>
+              <a:rPr lang="en-US"/>
+              <a:t>Second level</a:t>
+            </a:r>
+          </a:p>
+          <a:p>
+            <a:pPr lvl="2"/>
+            <a:r>
+              <a:rPr lang="en-US"/>
+              <a:t>Third level</a:t>
+            </a:r>
+          </a:p>
+          <a:p>
+            <a:pPr lvl="3"/>
+            <a:r>
+              <a:rPr lang="en-US"/>
+              <a:t>Fourth level</a:t>
+            </a:r>
+          </a:p>
+          <a:p>
+            <a:pPr lvl="4"/>
+            <a:r>
+              <a:rPr lang="en-US"/>
+              <a:t>Fifth level</a:t>
+            </a:r>
+            <a:endParaRPr lang="de-DE"/>
+          </a:p>
+        </p:txBody>
+      </p:sp>
+      <p:sp>
+        <p:nvSpPr>
+          <p:cNvPr id="6" name="Footer Placeholder 5"/>
+          <p:cNvSpPr>
+            <a:spLocks noGrp="1"/>
+          </p:cNvSpPr>
+          <p:nvPr>
+            <p:ph type="ftr" sz="quarter" idx="4"/>
+          </p:nvPr>
+        </p:nvSpPr>
+        <p:spPr>
+          <a:xfrm>
+            <a:off x="0" y="8685213"/>
+            <a:ext cx="2971800" cy="458787"/>
+          </a:xfrm>
+          <a:prstGeom prst="rect">
+            <a:avLst/>
+          </a:prstGeom>
+        </p:spPr>
+        <p:txBody>
+          <a:bodyPr vert="horz" lIns="91440" tIns="45720" rIns="91440" bIns="45720" rtlCol="0" anchor="b"/>
+          <a:lstStyle>
+            <a:lvl1pPr algn="l">
+              <a:defRPr sz="1200"/>
+            </a:lvl1pPr>
+          </a:lstStyle>
+          <a:p>
+            <a:endParaRPr lang="de-DE"/>
+          </a:p>
+        </p:txBody>
+      </p:sp>
+      <p:sp>
+        <p:nvSpPr>
+          <p:cNvPr id="7" name="Slide Number Placeholder 6"/>
+          <p:cNvSpPr>
+            <a:spLocks noGrp="1"/>
+          </p:cNvSpPr>
+          <p:nvPr>
+            <p:ph type="sldNum" sz="quarter" idx="5"/>
+          </p:nvPr>
+        </p:nvSpPr>
+        <p:spPr>
+          <a:xfrm>
+            <a:off x="3884613" y="8685213"/>
+            <a:ext cx="2971800" cy="458787"/>
+          </a:xfrm>
+          <a:prstGeom prst="rect">
+            <a:avLst/>
+          </a:prstGeom>
+        </p:spPr>
+        <p:txBody>
+          <a:bodyPr vert="horz" lIns="91440" tIns="45720" rIns="91440" bIns="45720" rtlCol="0" anchor="b"/>
+          <a:lstStyle>
+            <a:lvl1pPr algn="r">
+              <a:defRPr sz="1200"/>
+            </a:lvl1pPr>
+          </a:lstStyle>
+          <a:p>
+            <a:fld id="{5024BDE3-6F31-4F50-B9DA-C06DE42B7D2E}" type="slidenum">
+              <a:rPr lang="de-DE" smtClean="0"/>
+              <a:t>‹#›</a:t>
+            </a:fld>
+            <a:endParaRPr lang="de-DE"/>
+          </a:p>
+        </p:txBody>
+      </p:sp>
+    </p:spTree>
+    <p:extLst>
+      <p:ext uri="{BB962C8B-B14F-4D97-AF65-F5344CB8AC3E}">
+        <p14:creationId xmlns:p14="http://schemas.microsoft.com/office/powerpoint/2010/main" val="2418029525"/>
+      </p:ext>
+    </p:extLst>
+  </p:cSld>
+  <p:clrMap bg1="lt1" tx1="dk1" bg2="lt2" tx2="dk2" accent1="accent1" accent2="accent2" accent3="accent3" accent4="accent4" accent5="accent5" accent6="accent6" hlink="hlink" folHlink="folHlink"/>
+  <p:notesStyle>
+    <a:lvl1pPr marL="0" algn="l" defTabSz="914400" rtl="0" eaLnBrk="1" latinLnBrk="0" hangingPunct="1">
+      <a:defRPr sz="1200" kern="1200">
+        <a:solidFill>
+          <a:schemeClr val="tx1"/>
+        </a:solidFill>
+        <a:latin typeface="+mn-lt"/>
+        <a:ea typeface="+mn-ea"/>
+        <a:cs typeface="+mn-cs"/>
+      </a:defRPr>
+    </a:lvl1pPr>
+    <a:lvl2pPr marL="457200" algn="l" defTabSz="914400" rtl="0" eaLnBrk="1" latinLnBrk="0" hangingPunct="1">
+      <a:defRPr sz="1200" kern="1200">
+        <a:solidFill>
+          <a:schemeClr val="tx1"/>
+        </a:solidFill>
+        <a:latin typeface="+mn-lt"/>
+        <a:ea typeface="+mn-ea"/>
+        <a:cs typeface="+mn-cs"/>
+      </a:defRPr>
+    </a:lvl2pPr>
+    <a:lvl3pPr marL="914400" algn="l" defTabSz="914400" rtl="0" eaLnBrk="1" latinLnBrk="0" hangingPunct="1">
+      <a:defRPr sz="1200" kern="1200">
+        <a:solidFill>
+          <a:schemeClr val="tx1"/>
+        </a:solidFill>
+        <a:latin typeface="+mn-lt"/>
+        <a:ea typeface="+mn-ea"/>
+        <a:cs typeface="+mn-cs"/>
+      </a:defRPr>
+    </a:lvl3pPr>
+    <a:lvl4pPr marL="1371600" algn="l" defTabSz="914400" rtl="0" eaLnBrk="1" latinLnBrk="0" hangingPunct="1">
+      <a:defRPr sz="1200" kern="1200">
+        <a:solidFill>
+          <a:schemeClr val="tx1"/>
+        </a:solidFill>
+        <a:latin typeface="+mn-lt"/>
+        <a:ea typeface="+mn-ea"/>
+        <a:cs typeface="+mn-cs"/>
+      </a:defRPr>
+    </a:lvl4pPr>
+    <a:lvl5pPr marL="1828800" algn="l" defTabSz="914400" rtl="0" eaLnBrk="1" latinLnBrk="0" hangingPunct="1">
+      <a:defRPr sz="1200" kern="1200">
+        <a:solidFill>
+          <a:schemeClr val="tx1"/>
+        </a:solidFill>
+        <a:latin typeface="+mn-lt"/>
+        <a:ea typeface="+mn-ea"/>
+        <a:cs typeface="+mn-cs"/>
+      </a:defRPr>
+    </a:lvl5pPr>
+    <a:lvl6pPr marL="2286000" algn="l" defTabSz="914400" rtl="0" eaLnBrk="1" latinLnBrk="0" hangingPunct="1">
+      <a:defRPr sz="1200" kern="1200">
+        <a:solidFill>
+          <a:schemeClr val="tx1"/>
+        </a:solidFill>
+        <a:latin typeface="+mn-lt"/>
+        <a:ea typeface="+mn-ea"/>
+        <a:cs typeface="+mn-cs"/>
+      </a:defRPr>
+    </a:lvl6pPr>
+    <a:lvl7pPr marL="2743200" algn="l" defTabSz="914400" rtl="0" eaLnBrk="1" latinLnBrk="0" hangingPunct="1">
+      <a:defRPr sz="1200" kern="1200">
+        <a:solidFill>
+          <a:schemeClr val="tx1"/>
+        </a:solidFill>
+        <a:latin typeface="+mn-lt"/>
+        <a:ea typeface="+mn-ea"/>
+        <a:cs typeface="+mn-cs"/>
+      </a:defRPr>
+    </a:lvl7pPr>
+    <a:lvl8pPr marL="3200400" algn="l" defTabSz="914400" rtl="0" eaLnBrk="1" latinLnBrk="0" hangingPunct="1">
+      <a:defRPr sz="1200" kern="1200">
+        <a:solidFill>
+          <a:schemeClr val="tx1"/>
+        </a:solidFill>
+        <a:latin typeface="+mn-lt"/>
+        <a:ea typeface="+mn-ea"/>
+        <a:cs typeface="+mn-cs"/>
+      </a:defRPr>
+    </a:lvl8pPr>
+    <a:lvl9pPr marL="3657600" algn="l" defTabSz="914400" rtl="0" eaLnBrk="1" latinLnBrk="0" hangingPunct="1">
+      <a:defRPr sz="1200" kern="1200">
+        <a:solidFill>
+          <a:schemeClr val="tx1"/>
+        </a:solidFill>
+        <a:latin typeface="+mn-lt"/>
+        <a:ea typeface="+mn-ea"/>
+        <a:cs typeface="+mn-cs"/>
+      </a:defRPr>
+    </a:lvl9pPr>
+  </p:notesStyle>
+</p:notesMaster>
+</file>
+
+<file path=ppt/notesSlides/notesSlide1.xml><?xml version="1.0" encoding="utf-8"?>
+<p:notes xmlns:a="http://schemas.openxmlformats.org/drawingml/2006/main" xmlns:r="http://schemas.openxmlformats.org/officeDocument/2006/relationships" xmlns:p="http://schemas.openxmlformats.org/presentationml/2006/main">
+  <p:cSld>
+    <p:spTree>
+      <p:nvGrpSpPr>
+        <p:cNvPr id="1" name=""/>
+        <p:cNvGrpSpPr/>
+        <p:nvPr/>
+      </p:nvGrpSpPr>
+      <p:grpSpPr>
+        <a:xfrm>
+          <a:off x="0" y="0"/>
+          <a:ext cx="0" cy="0"/>
+          <a:chOff x="0" y="0"/>
+          <a:chExt cx="0" cy="0"/>
+        </a:xfrm>
+      </p:grpSpPr>
+      <p:sp>
+        <p:nvSpPr>
+          <p:cNvPr id="2" name="Slide Image Placeholder 1"/>
+          <p:cNvSpPr>
+            <a:spLocks noGrp="1" noRot="1" noChangeAspect="1"/>
+          </p:cNvSpPr>
+          <p:nvPr>
+            <p:ph type="sldImg"/>
+          </p:nvPr>
+        </p:nvSpPr>
+        <p:spPr/>
+      </p:sp>
+      <p:sp>
+        <p:nvSpPr>
+          <p:cNvPr id="3" name="Notes Placeholder 2"/>
+          <p:cNvSpPr>
+            <a:spLocks noGrp="1"/>
+          </p:cNvSpPr>
+          <p:nvPr>
+            <p:ph type="body" idx="1"/>
+          </p:nvPr>
+        </p:nvSpPr>
+        <p:spPr/>
+        <p:txBody>
+          <a:bodyPr/>
+          <a:lstStyle/>
+          <a:p>
+            <a:r>
+              <a:rPr lang="de-DE" dirty="0"/>
+              <a:t>Hello and </a:t>
+            </a:r>
+            <a:r>
+              <a:rPr lang="de-DE" dirty="0" err="1"/>
+              <a:t>welcome</a:t>
+            </a:r>
+            <a:r>
+              <a:rPr lang="de-DE" dirty="0"/>
+              <a:t> </a:t>
+            </a:r>
+            <a:r>
+              <a:rPr lang="de-DE" dirty="0" err="1"/>
+              <a:t>to</a:t>
+            </a:r>
+            <a:r>
+              <a:rPr lang="de-DE" dirty="0"/>
+              <a:t> </a:t>
+            </a:r>
+            <a:r>
+              <a:rPr lang="de-DE" dirty="0" err="1"/>
+              <a:t>my</a:t>
+            </a:r>
+            <a:r>
+              <a:rPr lang="de-DE" dirty="0"/>
+              <a:t> final </a:t>
+            </a:r>
+            <a:r>
+              <a:rPr lang="de-DE" dirty="0" err="1"/>
+              <a:t>project</a:t>
+            </a:r>
+            <a:r>
+              <a:rPr lang="de-DE" dirty="0"/>
+              <a:t> </a:t>
+            </a:r>
+            <a:r>
+              <a:rPr lang="de-DE" dirty="0" err="1"/>
+              <a:t>presentation</a:t>
+            </a:r>
+            <a:r>
+              <a:rPr lang="de-DE" dirty="0"/>
+              <a:t>. I </a:t>
+            </a:r>
+            <a:r>
+              <a:rPr lang="de-DE" dirty="0" err="1"/>
+              <a:t>created</a:t>
+            </a:r>
+            <a:r>
+              <a:rPr lang="de-DE" dirty="0"/>
+              <a:t> an A.I </a:t>
+            </a:r>
+            <a:r>
+              <a:rPr lang="de-DE" dirty="0" err="1"/>
+              <a:t>that</a:t>
+            </a:r>
+            <a:r>
+              <a:rPr lang="de-DE" dirty="0"/>
+              <a:t> </a:t>
+            </a:r>
+            <a:r>
+              <a:rPr lang="de-DE" dirty="0" err="1"/>
+              <a:t>is</a:t>
+            </a:r>
+            <a:r>
+              <a:rPr lang="de-DE" dirty="0"/>
+              <a:t> </a:t>
+            </a:r>
+            <a:r>
+              <a:rPr lang="de-DE" dirty="0" err="1"/>
+              <a:t>able</a:t>
+            </a:r>
+            <a:r>
+              <a:rPr lang="de-DE" dirty="0"/>
+              <a:t> </a:t>
+            </a:r>
+            <a:r>
+              <a:rPr lang="de-DE" dirty="0" err="1"/>
+              <a:t>to</a:t>
+            </a:r>
+            <a:r>
+              <a:rPr lang="de-DE" dirty="0"/>
+              <a:t> </a:t>
+            </a:r>
+            <a:r>
+              <a:rPr lang="de-DE" dirty="0" err="1"/>
+              <a:t>write</a:t>
+            </a:r>
+            <a:r>
+              <a:rPr lang="de-DE" dirty="0"/>
+              <a:t> </a:t>
+            </a:r>
+            <a:r>
+              <a:rPr lang="de-DE" dirty="0" err="1"/>
+              <a:t>poems</a:t>
+            </a:r>
+            <a:r>
+              <a:rPr lang="de-DE" dirty="0"/>
+              <a:t>.</a:t>
+            </a:r>
+          </a:p>
+          <a:p>
+            <a:r>
+              <a:rPr lang="de-DE" dirty="0"/>
+              <a:t>And </a:t>
+            </a:r>
+            <a:r>
+              <a:rPr lang="de-DE" dirty="0" err="1"/>
+              <a:t>before</a:t>
+            </a:r>
+            <a:r>
+              <a:rPr lang="de-DE" dirty="0"/>
+              <a:t> </a:t>
+            </a:r>
+            <a:r>
+              <a:rPr lang="de-DE" dirty="0" err="1"/>
+              <a:t>we</a:t>
+            </a:r>
+            <a:r>
+              <a:rPr lang="de-DE" dirty="0"/>
+              <a:t> </a:t>
+            </a:r>
+            <a:r>
+              <a:rPr lang="de-DE" dirty="0" err="1"/>
+              <a:t>dive</a:t>
+            </a:r>
+            <a:r>
+              <a:rPr lang="de-DE" dirty="0"/>
+              <a:t> </a:t>
+            </a:r>
+            <a:r>
+              <a:rPr lang="de-DE" dirty="0" err="1"/>
+              <a:t>into</a:t>
+            </a:r>
+            <a:r>
+              <a:rPr lang="de-DE" dirty="0"/>
+              <a:t> </a:t>
+            </a:r>
+            <a:r>
+              <a:rPr lang="de-DE" dirty="0" err="1"/>
+              <a:t>my</a:t>
+            </a:r>
+            <a:r>
+              <a:rPr lang="de-DE" dirty="0"/>
+              <a:t> </a:t>
+            </a:r>
+            <a:r>
+              <a:rPr lang="de-DE" dirty="0" err="1"/>
+              <a:t>approach</a:t>
+            </a:r>
+            <a:r>
+              <a:rPr lang="de-DE" dirty="0"/>
+              <a:t> on </a:t>
+            </a:r>
+            <a:r>
+              <a:rPr lang="de-DE" dirty="0" err="1"/>
+              <a:t>this</a:t>
+            </a:r>
+            <a:r>
+              <a:rPr lang="de-DE" dirty="0"/>
+              <a:t> </a:t>
+            </a:r>
+            <a:r>
+              <a:rPr lang="de-DE" dirty="0" err="1"/>
+              <a:t>task</a:t>
+            </a:r>
+            <a:r>
+              <a:rPr lang="de-DE" dirty="0"/>
+              <a:t>, i </a:t>
+            </a:r>
+            <a:r>
+              <a:rPr lang="de-DE" dirty="0" err="1"/>
+              <a:t>would</a:t>
+            </a:r>
+            <a:r>
+              <a:rPr lang="de-DE" dirty="0"/>
+              <a:t> like </a:t>
+            </a:r>
+            <a:r>
+              <a:rPr lang="de-DE" dirty="0" err="1"/>
+              <a:t>to</a:t>
+            </a:r>
+            <a:r>
+              <a:rPr lang="de-DE" dirty="0"/>
+              <a:t> </a:t>
+            </a:r>
+            <a:r>
+              <a:rPr lang="de-DE" dirty="0" err="1"/>
+              <a:t>show</a:t>
+            </a:r>
+            <a:r>
+              <a:rPr lang="de-DE" dirty="0"/>
+              <a:t> </a:t>
+            </a:r>
+            <a:r>
+              <a:rPr lang="de-DE" dirty="0" err="1"/>
+              <a:t>you</a:t>
+            </a:r>
+            <a:r>
+              <a:rPr lang="de-DE" dirty="0"/>
+              <a:t> </a:t>
+            </a:r>
+            <a:r>
+              <a:rPr lang="de-DE" dirty="0" err="1"/>
+              <a:t>two</a:t>
+            </a:r>
+            <a:r>
+              <a:rPr lang="de-DE" dirty="0"/>
+              <a:t> </a:t>
+            </a:r>
+            <a:r>
+              <a:rPr lang="de-DE" dirty="0" err="1"/>
+              <a:t>poems</a:t>
+            </a:r>
+            <a:endParaRPr lang="de-DE" dirty="0"/>
+          </a:p>
+        </p:txBody>
+      </p:sp>
+      <p:sp>
+        <p:nvSpPr>
+          <p:cNvPr id="4" name="Slide Number Placeholder 3"/>
+          <p:cNvSpPr>
+            <a:spLocks noGrp="1"/>
+          </p:cNvSpPr>
+          <p:nvPr>
+            <p:ph type="sldNum" sz="quarter" idx="5"/>
+          </p:nvPr>
+        </p:nvSpPr>
+        <p:spPr/>
+        <p:txBody>
+          <a:bodyPr/>
+          <a:lstStyle/>
+          <a:p>
+            <a:fld id="{5024BDE3-6F31-4F50-B9DA-C06DE42B7D2E}" type="slidenum">
+              <a:rPr lang="de-DE" smtClean="0"/>
+              <a:t>1</a:t>
+            </a:fld>
+            <a:endParaRPr lang="de-DE"/>
+          </a:p>
+        </p:txBody>
+      </p:sp>
+    </p:spTree>
+    <p:extLst>
+      <p:ext uri="{BB962C8B-B14F-4D97-AF65-F5344CB8AC3E}">
+        <p14:creationId xmlns:p14="http://schemas.microsoft.com/office/powerpoint/2010/main" val="1886651352"/>
+      </p:ext>
+    </p:extLst>
+  </p:cSld>
+  <p:clrMapOvr>
+    <a:masterClrMapping/>
+  </p:clrMapOvr>
+</p:notes>
+</file>
+
+<file path=ppt/notesSlides/notesSlide2.xml><?xml version="1.0" encoding="utf-8"?>
+<p:notes xmlns:a="http://schemas.openxmlformats.org/drawingml/2006/main" xmlns:r="http://schemas.openxmlformats.org/officeDocument/2006/relationships" xmlns:p="http://schemas.openxmlformats.org/presentationml/2006/main">
+  <p:cSld>
+    <p:spTree>
+      <p:nvGrpSpPr>
+        <p:cNvPr id="1" name=""/>
+        <p:cNvGrpSpPr/>
+        <p:nvPr/>
+      </p:nvGrpSpPr>
+      <p:grpSpPr>
+        <a:xfrm>
+          <a:off x="0" y="0"/>
+          <a:ext cx="0" cy="0"/>
+          <a:chOff x="0" y="0"/>
+          <a:chExt cx="0" cy="0"/>
+        </a:xfrm>
+      </p:grpSpPr>
+      <p:sp>
+        <p:nvSpPr>
+          <p:cNvPr id="2" name="Slide Image Placeholder 1"/>
+          <p:cNvSpPr>
+            <a:spLocks noGrp="1" noRot="1" noChangeAspect="1"/>
+          </p:cNvSpPr>
+          <p:nvPr>
+            <p:ph type="sldImg"/>
+          </p:nvPr>
+        </p:nvSpPr>
+        <p:spPr/>
+      </p:sp>
+      <p:sp>
+        <p:nvSpPr>
+          <p:cNvPr id="3" name="Notes Placeholder 2"/>
+          <p:cNvSpPr>
+            <a:spLocks noGrp="1"/>
+          </p:cNvSpPr>
+          <p:nvPr>
+            <p:ph type="body" idx="1"/>
+          </p:nvPr>
+        </p:nvSpPr>
+        <p:spPr/>
+        <p:txBody>
+          <a:bodyPr/>
+          <a:lstStyle/>
+          <a:p>
+            <a:r>
+              <a:rPr lang="de-DE" dirty="0" err="1"/>
+              <a:t>One</a:t>
+            </a:r>
+            <a:r>
+              <a:rPr lang="de-DE" dirty="0"/>
+              <a:t> </a:t>
+            </a:r>
+            <a:r>
+              <a:rPr lang="de-DE" dirty="0" err="1"/>
+              <a:t>of</a:t>
+            </a:r>
+            <a:r>
+              <a:rPr lang="de-DE" dirty="0"/>
+              <a:t> </a:t>
+            </a:r>
+            <a:r>
+              <a:rPr lang="de-DE" dirty="0" err="1"/>
+              <a:t>it</a:t>
+            </a:r>
+            <a:r>
+              <a:rPr lang="de-DE" dirty="0"/>
+              <a:t> </a:t>
+            </a:r>
+            <a:r>
+              <a:rPr lang="de-DE" dirty="0" err="1"/>
+              <a:t>is</a:t>
+            </a:r>
+            <a:r>
+              <a:rPr lang="de-DE" dirty="0"/>
+              <a:t> an </a:t>
+            </a:r>
+            <a:r>
+              <a:rPr lang="de-DE" dirty="0" err="1"/>
+              <a:t>output</a:t>
+            </a:r>
+            <a:r>
+              <a:rPr lang="de-DE" dirty="0"/>
+              <a:t> I </a:t>
+            </a:r>
+            <a:r>
+              <a:rPr lang="de-DE" dirty="0" err="1"/>
+              <a:t>got</a:t>
+            </a:r>
+            <a:r>
+              <a:rPr lang="de-DE" dirty="0"/>
+              <a:t> </a:t>
+            </a:r>
+            <a:r>
+              <a:rPr lang="de-DE" dirty="0" err="1"/>
+              <a:t>from</a:t>
+            </a:r>
+            <a:r>
+              <a:rPr lang="de-DE" dirty="0"/>
+              <a:t> </a:t>
+            </a:r>
+            <a:r>
+              <a:rPr lang="de-DE" dirty="0" err="1"/>
+              <a:t>the</a:t>
+            </a:r>
+            <a:r>
+              <a:rPr lang="de-DE" dirty="0"/>
+              <a:t> AI and </a:t>
+            </a:r>
+            <a:r>
+              <a:rPr lang="de-DE" dirty="0" err="1"/>
+              <a:t>the</a:t>
+            </a:r>
+            <a:r>
+              <a:rPr lang="de-DE" dirty="0"/>
+              <a:t> </a:t>
+            </a:r>
+            <a:r>
+              <a:rPr lang="de-DE" dirty="0" err="1"/>
+              <a:t>other</a:t>
+            </a:r>
+            <a:r>
+              <a:rPr lang="de-DE" dirty="0"/>
+              <a:t> </a:t>
+            </a:r>
+            <a:r>
+              <a:rPr lang="de-DE" dirty="0" err="1"/>
+              <a:t>one</a:t>
+            </a:r>
+            <a:r>
+              <a:rPr lang="de-DE" dirty="0"/>
+              <a:t> </a:t>
+            </a:r>
+            <a:r>
+              <a:rPr lang="de-DE" dirty="0" err="1"/>
+              <a:t>is</a:t>
+            </a:r>
+            <a:r>
+              <a:rPr lang="de-DE" dirty="0"/>
+              <a:t> </a:t>
+            </a:r>
+            <a:r>
+              <a:rPr lang="de-DE" dirty="0" err="1"/>
+              <a:t>part</a:t>
+            </a:r>
+            <a:r>
+              <a:rPr lang="de-DE" dirty="0"/>
+              <a:t> </a:t>
+            </a:r>
+            <a:r>
+              <a:rPr lang="de-DE" dirty="0" err="1"/>
+              <a:t>of</a:t>
+            </a:r>
+            <a:r>
+              <a:rPr lang="de-DE" dirty="0"/>
+              <a:t> a real </a:t>
+            </a:r>
+            <a:r>
+              <a:rPr lang="de-DE" dirty="0" err="1"/>
+              <a:t>poem</a:t>
+            </a:r>
+            <a:r>
+              <a:rPr lang="de-DE" dirty="0"/>
+              <a:t>. </a:t>
+            </a:r>
+          </a:p>
+          <a:p>
+            <a:r>
+              <a:rPr lang="de-DE" dirty="0"/>
+              <a:t>I will </a:t>
+            </a:r>
+            <a:r>
+              <a:rPr lang="de-DE" dirty="0" err="1"/>
+              <a:t>read</a:t>
+            </a:r>
+            <a:r>
+              <a:rPr lang="de-DE" dirty="0"/>
+              <a:t> </a:t>
+            </a:r>
+            <a:r>
+              <a:rPr lang="de-DE" dirty="0" err="1"/>
+              <a:t>them</a:t>
+            </a:r>
+            <a:r>
+              <a:rPr lang="de-DE" dirty="0"/>
+              <a:t> </a:t>
+            </a:r>
+            <a:r>
+              <a:rPr lang="de-DE" dirty="0" err="1"/>
+              <a:t>to</a:t>
+            </a:r>
+            <a:r>
+              <a:rPr lang="de-DE" dirty="0"/>
+              <a:t> </a:t>
+            </a:r>
+            <a:r>
+              <a:rPr lang="de-DE" dirty="0" err="1"/>
+              <a:t>you</a:t>
+            </a:r>
+            <a:r>
+              <a:rPr lang="de-DE" dirty="0"/>
+              <a:t> and I </a:t>
+            </a:r>
+            <a:r>
+              <a:rPr lang="de-DE" dirty="0" err="1"/>
+              <a:t>would</a:t>
+            </a:r>
+            <a:r>
+              <a:rPr lang="de-DE" dirty="0"/>
+              <a:t> like </a:t>
+            </a:r>
+            <a:r>
+              <a:rPr lang="de-DE" dirty="0" err="1"/>
+              <a:t>you</a:t>
+            </a:r>
+            <a:r>
+              <a:rPr lang="de-DE" dirty="0"/>
+              <a:t> </a:t>
+            </a:r>
+            <a:r>
+              <a:rPr lang="de-DE" dirty="0" err="1"/>
+              <a:t>to</a:t>
+            </a:r>
+            <a:r>
+              <a:rPr lang="de-DE" dirty="0"/>
+              <a:t> </a:t>
+            </a:r>
+            <a:r>
+              <a:rPr lang="de-DE" dirty="0" err="1"/>
+              <a:t>guess</a:t>
+            </a:r>
+            <a:r>
+              <a:rPr lang="de-DE" dirty="0"/>
+              <a:t> </a:t>
+            </a:r>
+            <a:r>
+              <a:rPr lang="de-DE" dirty="0" err="1"/>
+              <a:t>which</a:t>
+            </a:r>
+            <a:r>
+              <a:rPr lang="de-DE" dirty="0"/>
+              <a:t> </a:t>
+            </a:r>
+            <a:r>
+              <a:rPr lang="de-DE" dirty="0" err="1"/>
+              <a:t>one</a:t>
+            </a:r>
+            <a:r>
+              <a:rPr lang="de-DE" dirty="0"/>
+              <a:t> </a:t>
+            </a:r>
+            <a:r>
+              <a:rPr lang="de-DE" dirty="0" err="1"/>
+              <a:t>is</a:t>
+            </a:r>
+            <a:r>
+              <a:rPr lang="de-DE" dirty="0"/>
+              <a:t> </a:t>
+            </a:r>
+            <a:r>
+              <a:rPr lang="de-DE" dirty="0" err="1"/>
+              <a:t>which</a:t>
+            </a:r>
+            <a:r>
+              <a:rPr lang="de-DE" dirty="0"/>
+              <a:t>.</a:t>
+            </a:r>
+          </a:p>
+          <a:p>
+            <a:r>
+              <a:rPr lang="de-DE" dirty="0" err="1"/>
+              <a:t>Now</a:t>
+            </a:r>
+            <a:r>
+              <a:rPr lang="de-DE" dirty="0"/>
+              <a:t> </a:t>
+            </a:r>
+            <a:r>
+              <a:rPr lang="de-DE" dirty="0" err="1"/>
+              <a:t>let</a:t>
+            </a:r>
+            <a:r>
+              <a:rPr lang="de-DE" dirty="0"/>
+              <a:t> </a:t>
+            </a:r>
+            <a:r>
+              <a:rPr lang="de-DE" dirty="0" err="1"/>
+              <a:t>me</a:t>
+            </a:r>
+            <a:r>
+              <a:rPr lang="de-DE" dirty="0"/>
+              <a:t> </a:t>
+            </a:r>
+            <a:r>
+              <a:rPr lang="de-DE" dirty="0" err="1"/>
+              <a:t>show</a:t>
+            </a:r>
+            <a:r>
+              <a:rPr lang="de-DE" dirty="0"/>
+              <a:t> </a:t>
+            </a:r>
+            <a:r>
+              <a:rPr lang="de-DE" dirty="0" err="1"/>
+              <a:t>you</a:t>
+            </a:r>
+            <a:r>
+              <a:rPr lang="de-DE" dirty="0"/>
+              <a:t> </a:t>
+            </a:r>
+            <a:r>
+              <a:rPr lang="de-DE" dirty="0" err="1"/>
+              <a:t>the</a:t>
+            </a:r>
+            <a:r>
+              <a:rPr lang="de-DE" dirty="0"/>
+              <a:t> AI in </a:t>
+            </a:r>
+            <a:r>
+              <a:rPr lang="de-DE" dirty="0" err="1"/>
+              <a:t>action</a:t>
+            </a:r>
+            <a:r>
+              <a:rPr lang="de-DE" dirty="0"/>
+              <a:t>…</a:t>
+            </a:r>
+          </a:p>
+        </p:txBody>
+      </p:sp>
+      <p:sp>
+        <p:nvSpPr>
+          <p:cNvPr id="4" name="Slide Number Placeholder 3"/>
+          <p:cNvSpPr>
+            <a:spLocks noGrp="1"/>
+          </p:cNvSpPr>
+          <p:nvPr>
+            <p:ph type="sldNum" sz="quarter" idx="5"/>
+          </p:nvPr>
+        </p:nvSpPr>
+        <p:spPr/>
+        <p:txBody>
+          <a:bodyPr/>
+          <a:lstStyle/>
+          <a:p>
+            <a:fld id="{5024BDE3-6F31-4F50-B9DA-C06DE42B7D2E}" type="slidenum">
+              <a:rPr lang="de-DE" smtClean="0"/>
+              <a:t>2</a:t>
+            </a:fld>
+            <a:endParaRPr lang="de-DE"/>
+          </a:p>
+        </p:txBody>
+      </p:sp>
+    </p:spTree>
+    <p:extLst>
+      <p:ext uri="{BB962C8B-B14F-4D97-AF65-F5344CB8AC3E}">
+        <p14:creationId xmlns:p14="http://schemas.microsoft.com/office/powerpoint/2010/main" val="841666065"/>
+      </p:ext>
+    </p:extLst>
+  </p:cSld>
+  <p:clrMapOvr>
+    <a:masterClrMapping/>
+  </p:clrMapOvr>
+</p:notes>
+</file>
+
+<file path=ppt/notesSlides/notesSlide3.xml><?xml version="1.0" encoding="utf-8"?>
+<p:notes xmlns:a="http://schemas.openxmlformats.org/drawingml/2006/main" xmlns:r="http://schemas.openxmlformats.org/officeDocument/2006/relationships" xmlns:p="http://schemas.openxmlformats.org/presentationml/2006/main">
+  <p:cSld>
+    <p:spTree>
+      <p:nvGrpSpPr>
+        <p:cNvPr id="1" name=""/>
+        <p:cNvGrpSpPr/>
+        <p:nvPr/>
+      </p:nvGrpSpPr>
+      <p:grpSpPr>
+        <a:xfrm>
+          <a:off x="0" y="0"/>
+          <a:ext cx="0" cy="0"/>
+          <a:chOff x="0" y="0"/>
+          <a:chExt cx="0" cy="0"/>
+        </a:xfrm>
+      </p:grpSpPr>
+      <p:sp>
+        <p:nvSpPr>
+          <p:cNvPr id="2" name="Slide Image Placeholder 1"/>
+          <p:cNvSpPr>
+            <a:spLocks noGrp="1" noRot="1" noChangeAspect="1"/>
+          </p:cNvSpPr>
+          <p:nvPr>
+            <p:ph type="sldImg"/>
+          </p:nvPr>
+        </p:nvSpPr>
+        <p:spPr/>
+      </p:sp>
+      <p:sp>
+        <p:nvSpPr>
+          <p:cNvPr id="3" name="Notes Placeholder 2"/>
+          <p:cNvSpPr>
+            <a:spLocks noGrp="1"/>
+          </p:cNvSpPr>
+          <p:nvPr>
+            <p:ph type="body" idx="1"/>
+          </p:nvPr>
+        </p:nvSpPr>
+        <p:spPr/>
+        <p:txBody>
+          <a:bodyPr/>
+          <a:lstStyle/>
+          <a:p>
+            <a:r>
+              <a:rPr lang="de-DE" dirty="0"/>
+              <a:t>The AI </a:t>
+            </a:r>
+            <a:r>
+              <a:rPr lang="de-DE" dirty="0" err="1"/>
+              <a:t>looks</a:t>
+            </a:r>
+            <a:r>
+              <a:rPr lang="de-DE" dirty="0"/>
+              <a:t> at </a:t>
+            </a:r>
+            <a:r>
+              <a:rPr lang="de-DE" dirty="0" err="1"/>
+              <a:t>preceding</a:t>
+            </a:r>
+            <a:r>
+              <a:rPr lang="de-DE" dirty="0"/>
+              <a:t> </a:t>
+            </a:r>
+            <a:r>
+              <a:rPr lang="de-DE" dirty="0" err="1"/>
+              <a:t>words</a:t>
+            </a:r>
+            <a:r>
+              <a:rPr lang="de-DE" dirty="0"/>
+              <a:t> and </a:t>
+            </a:r>
+            <a:r>
+              <a:rPr lang="de-DE" dirty="0" err="1"/>
+              <a:t>predicts</a:t>
+            </a:r>
+            <a:r>
+              <a:rPr lang="de-DE" dirty="0"/>
+              <a:t> </a:t>
+            </a:r>
+            <a:r>
+              <a:rPr lang="de-DE" dirty="0" err="1"/>
+              <a:t>the</a:t>
+            </a:r>
+            <a:r>
+              <a:rPr lang="de-DE" dirty="0"/>
+              <a:t> </a:t>
+            </a:r>
+            <a:r>
+              <a:rPr lang="de-DE" dirty="0" err="1"/>
+              <a:t>next</a:t>
+            </a:r>
+            <a:r>
+              <a:rPr lang="de-DE" dirty="0"/>
+              <a:t> </a:t>
+            </a:r>
+            <a:r>
+              <a:rPr lang="de-DE" dirty="0" err="1"/>
+              <a:t>most</a:t>
+            </a:r>
+            <a:r>
+              <a:rPr lang="de-DE" dirty="0"/>
+              <a:t> </a:t>
+            </a:r>
+            <a:r>
+              <a:rPr lang="de-DE" dirty="0" err="1"/>
+              <a:t>likely</a:t>
+            </a:r>
+            <a:r>
+              <a:rPr lang="de-DE" dirty="0"/>
+              <a:t> </a:t>
+            </a:r>
+            <a:r>
+              <a:rPr lang="de-DE" dirty="0" err="1"/>
+              <a:t>word</a:t>
+            </a:r>
+            <a:endParaRPr lang="de-DE" dirty="0"/>
+          </a:p>
+          <a:p>
+            <a:r>
+              <a:rPr lang="de-DE" dirty="0" err="1"/>
+              <a:t>It</a:t>
+            </a:r>
+            <a:r>
+              <a:rPr lang="de-DE" dirty="0"/>
+              <a:t> </a:t>
+            </a:r>
+            <a:r>
+              <a:rPr lang="de-DE" dirty="0" err="1"/>
+              <a:t>is</a:t>
+            </a:r>
+            <a:r>
+              <a:rPr lang="de-DE" dirty="0"/>
+              <a:t> </a:t>
+            </a:r>
+            <a:r>
+              <a:rPr lang="de-DE" dirty="0" err="1"/>
+              <a:t>based</a:t>
+            </a:r>
+            <a:r>
+              <a:rPr lang="de-DE" dirty="0"/>
+              <a:t> on a </a:t>
+            </a:r>
+            <a:r>
+              <a:rPr lang="de-DE" dirty="0" err="1"/>
+              <a:t>bidirectional</a:t>
+            </a:r>
+            <a:r>
+              <a:rPr lang="de-DE" dirty="0"/>
+              <a:t> LSTM-model. I will not </a:t>
+            </a:r>
+            <a:r>
+              <a:rPr lang="de-DE" dirty="0" err="1"/>
+              <a:t>go</a:t>
+            </a:r>
+            <a:r>
+              <a:rPr lang="de-DE" dirty="0"/>
+              <a:t> </a:t>
+            </a:r>
+            <a:r>
+              <a:rPr lang="de-DE" dirty="0" err="1"/>
+              <a:t>into</a:t>
+            </a:r>
+            <a:r>
+              <a:rPr lang="de-DE" dirty="0"/>
+              <a:t> </a:t>
+            </a:r>
+            <a:r>
+              <a:rPr lang="de-DE" dirty="0" err="1"/>
+              <a:t>the</a:t>
+            </a:r>
+            <a:r>
+              <a:rPr lang="de-DE" dirty="0"/>
+              <a:t> </a:t>
+            </a:r>
+            <a:r>
+              <a:rPr lang="de-DE" dirty="0" err="1"/>
+              <a:t>details</a:t>
+            </a:r>
+            <a:r>
+              <a:rPr lang="de-DE" dirty="0"/>
+              <a:t> </a:t>
+            </a:r>
+            <a:r>
+              <a:rPr lang="de-DE" dirty="0" err="1"/>
+              <a:t>of</a:t>
+            </a:r>
+            <a:r>
+              <a:rPr lang="de-DE" dirty="0"/>
+              <a:t> LSTM-models, </a:t>
+            </a:r>
+            <a:r>
+              <a:rPr lang="de-DE" dirty="0" err="1"/>
+              <a:t>only</a:t>
+            </a:r>
+            <a:r>
+              <a:rPr lang="de-DE" dirty="0"/>
+              <a:t> </a:t>
+            </a:r>
+            <a:r>
+              <a:rPr lang="de-DE" dirty="0" err="1"/>
+              <a:t>that</a:t>
+            </a:r>
+            <a:r>
+              <a:rPr lang="de-DE" dirty="0"/>
+              <a:t> </a:t>
+            </a:r>
+            <a:r>
+              <a:rPr lang="de-DE" dirty="0" err="1"/>
+              <a:t>it</a:t>
+            </a:r>
+            <a:r>
+              <a:rPr lang="de-DE" dirty="0"/>
+              <a:t> </a:t>
+            </a:r>
+            <a:r>
+              <a:rPr lang="de-DE" dirty="0" err="1"/>
+              <a:t>can</a:t>
+            </a:r>
+            <a:r>
+              <a:rPr lang="de-DE" dirty="0"/>
+              <a:t> </a:t>
+            </a:r>
+            <a:r>
+              <a:rPr lang="de-DE" dirty="0" err="1"/>
+              <a:t>retain</a:t>
+            </a:r>
+            <a:r>
+              <a:rPr lang="de-DE" dirty="0"/>
+              <a:t> </a:t>
+            </a:r>
+            <a:r>
+              <a:rPr lang="de-DE" dirty="0" err="1"/>
+              <a:t>information</a:t>
+            </a:r>
+            <a:r>
+              <a:rPr lang="de-DE" dirty="0"/>
+              <a:t> </a:t>
+            </a:r>
+            <a:r>
+              <a:rPr lang="de-DE" dirty="0" err="1"/>
+              <a:t>while</a:t>
+            </a:r>
+            <a:r>
+              <a:rPr lang="de-DE" dirty="0"/>
+              <a:t> </a:t>
+            </a:r>
+            <a:r>
+              <a:rPr lang="de-DE" dirty="0" err="1"/>
+              <a:t>learning</a:t>
+            </a:r>
+            <a:r>
+              <a:rPr lang="de-DE" dirty="0"/>
+              <a:t>. So </a:t>
+            </a:r>
+            <a:r>
+              <a:rPr lang="de-DE" dirty="0" err="1"/>
+              <a:t>if</a:t>
+            </a:r>
+            <a:r>
+              <a:rPr lang="de-DE" dirty="0"/>
+              <a:t> </a:t>
+            </a:r>
+            <a:r>
+              <a:rPr lang="de-DE" dirty="0" err="1"/>
+              <a:t>it</a:t>
+            </a:r>
+            <a:r>
+              <a:rPr lang="de-DE" dirty="0"/>
+              <a:t> </a:t>
+            </a:r>
+            <a:r>
+              <a:rPr lang="de-DE" dirty="0" err="1"/>
+              <a:t>takes</a:t>
+            </a:r>
+            <a:r>
+              <a:rPr lang="de-DE" dirty="0"/>
+              <a:t> </a:t>
+            </a:r>
+            <a:r>
+              <a:rPr lang="de-DE" dirty="0" err="1"/>
+              <a:t>the</a:t>
+            </a:r>
+            <a:r>
+              <a:rPr lang="de-DE" dirty="0"/>
+              <a:t> </a:t>
+            </a:r>
+            <a:r>
+              <a:rPr lang="de-DE" dirty="0" err="1"/>
+              <a:t>beginning</a:t>
+            </a:r>
+            <a:r>
+              <a:rPr lang="de-DE" dirty="0"/>
+              <a:t> </a:t>
+            </a:r>
+            <a:r>
+              <a:rPr lang="de-DE" dirty="0" err="1"/>
+              <a:t>of</a:t>
+            </a:r>
+            <a:r>
+              <a:rPr lang="de-DE" dirty="0"/>
+              <a:t> a </a:t>
+            </a:r>
+            <a:r>
+              <a:rPr lang="de-DE" dirty="0" err="1"/>
+              <a:t>sentence</a:t>
+            </a:r>
+            <a:r>
+              <a:rPr lang="de-DE" dirty="0"/>
+              <a:t> </a:t>
+            </a:r>
+            <a:r>
+              <a:rPr lang="de-DE" dirty="0" err="1"/>
+              <a:t>into</a:t>
+            </a:r>
+            <a:r>
+              <a:rPr lang="de-DE" dirty="0"/>
+              <a:t> </a:t>
+            </a:r>
+            <a:r>
+              <a:rPr lang="de-DE" dirty="0" err="1"/>
+              <a:t>account</a:t>
+            </a:r>
+            <a:r>
+              <a:rPr lang="de-DE" dirty="0"/>
+              <a:t> </a:t>
+            </a:r>
+            <a:r>
+              <a:rPr lang="de-DE" dirty="0" err="1"/>
+              <a:t>while</a:t>
+            </a:r>
+            <a:r>
+              <a:rPr lang="de-DE" dirty="0"/>
+              <a:t> </a:t>
+            </a:r>
+            <a:r>
+              <a:rPr lang="de-DE" dirty="0" err="1"/>
+              <a:t>computing</a:t>
+            </a:r>
+            <a:r>
+              <a:rPr lang="de-DE" dirty="0"/>
+              <a:t> </a:t>
+            </a:r>
+            <a:r>
+              <a:rPr lang="de-DE" dirty="0" err="1"/>
+              <a:t>the</a:t>
+            </a:r>
+            <a:r>
+              <a:rPr lang="de-DE" dirty="0"/>
+              <a:t> </a:t>
+            </a:r>
+            <a:r>
+              <a:rPr lang="de-DE" dirty="0" err="1"/>
+              <a:t>word</a:t>
+            </a:r>
+            <a:r>
+              <a:rPr lang="de-DE" dirty="0"/>
+              <a:t> in </a:t>
+            </a:r>
+            <a:r>
+              <a:rPr lang="de-DE" dirty="0" err="1"/>
+              <a:t>the</a:t>
+            </a:r>
+            <a:r>
+              <a:rPr lang="de-DE" dirty="0"/>
+              <a:t> end </a:t>
+            </a:r>
+            <a:r>
+              <a:rPr lang="de-DE" dirty="0" err="1"/>
+              <a:t>of</a:t>
+            </a:r>
+            <a:r>
+              <a:rPr lang="de-DE" dirty="0"/>
+              <a:t> it.</a:t>
+            </a:r>
+          </a:p>
+          <a:p>
+            <a:r>
+              <a:rPr lang="de-DE" dirty="0"/>
+              <a:t>I </a:t>
+            </a:r>
+            <a:r>
+              <a:rPr lang="de-DE" dirty="0" err="1"/>
+              <a:t>fed</a:t>
+            </a:r>
+            <a:r>
+              <a:rPr lang="de-DE" dirty="0"/>
+              <a:t> </a:t>
+            </a:r>
+            <a:r>
+              <a:rPr lang="de-DE" dirty="0" err="1"/>
+              <a:t>this</a:t>
+            </a:r>
+            <a:r>
+              <a:rPr lang="de-DE" dirty="0"/>
+              <a:t> ML-model </a:t>
+            </a:r>
+            <a:r>
+              <a:rPr lang="de-DE" dirty="0" err="1"/>
+              <a:t>with</a:t>
+            </a:r>
+            <a:r>
+              <a:rPr lang="de-DE" dirty="0"/>
+              <a:t> </a:t>
+            </a:r>
+            <a:r>
+              <a:rPr lang="de-DE" dirty="0" err="1"/>
+              <a:t>about</a:t>
+            </a:r>
+            <a:r>
+              <a:rPr lang="de-DE" dirty="0"/>
+              <a:t> 100 </a:t>
+            </a:r>
+            <a:r>
+              <a:rPr lang="de-DE" dirty="0" err="1"/>
+              <a:t>poems</a:t>
+            </a:r>
+            <a:r>
+              <a:rPr lang="de-DE" dirty="0"/>
+              <a:t> </a:t>
+            </a:r>
+            <a:r>
+              <a:rPr lang="de-DE" dirty="0" err="1"/>
+              <a:t>from</a:t>
+            </a:r>
+            <a:r>
+              <a:rPr lang="de-DE" dirty="0"/>
+              <a:t> Mary Oliver. An </a:t>
+            </a:r>
+            <a:r>
+              <a:rPr lang="de-DE" dirty="0" err="1"/>
+              <a:t>american</a:t>
+            </a:r>
+            <a:r>
+              <a:rPr lang="de-DE" dirty="0"/>
+              <a:t> </a:t>
+            </a:r>
+            <a:r>
+              <a:rPr lang="de-DE" dirty="0" err="1"/>
+              <a:t>poet</a:t>
+            </a:r>
+            <a:r>
+              <a:rPr lang="de-DE" dirty="0"/>
+              <a:t>, </a:t>
+            </a:r>
+            <a:r>
+              <a:rPr lang="de-DE" dirty="0" err="1"/>
+              <a:t>who</a:t>
+            </a:r>
+            <a:r>
+              <a:rPr lang="de-DE" dirty="0"/>
+              <a:t> was </a:t>
+            </a:r>
+            <a:r>
+              <a:rPr lang="de-DE" dirty="0" err="1"/>
+              <a:t>writing</a:t>
+            </a:r>
+            <a:r>
+              <a:rPr lang="de-DE" dirty="0"/>
+              <a:t> </a:t>
+            </a:r>
+            <a:r>
+              <a:rPr lang="de-DE" dirty="0" err="1"/>
+              <a:t>mainly</a:t>
+            </a:r>
+            <a:r>
+              <a:rPr lang="de-DE" dirty="0"/>
+              <a:t> </a:t>
+            </a:r>
+            <a:r>
+              <a:rPr lang="de-DE" dirty="0" err="1"/>
+              <a:t>about</a:t>
+            </a:r>
+            <a:r>
+              <a:rPr lang="de-DE" dirty="0"/>
+              <a:t> </a:t>
+            </a:r>
+            <a:r>
+              <a:rPr lang="de-DE" dirty="0" err="1"/>
+              <a:t>nature</a:t>
+            </a:r>
+            <a:r>
+              <a:rPr lang="de-DE" dirty="0"/>
+              <a:t>-</a:t>
+            </a:r>
+          </a:p>
+          <a:p>
+            <a:endParaRPr lang="de-DE" dirty="0"/>
+          </a:p>
+        </p:txBody>
+      </p:sp>
+      <p:sp>
+        <p:nvSpPr>
+          <p:cNvPr id="4" name="Slide Number Placeholder 3"/>
+          <p:cNvSpPr>
+            <a:spLocks noGrp="1"/>
+          </p:cNvSpPr>
+          <p:nvPr>
+            <p:ph type="sldNum" sz="quarter" idx="5"/>
+          </p:nvPr>
+        </p:nvSpPr>
+        <p:spPr/>
+        <p:txBody>
+          <a:bodyPr/>
+          <a:lstStyle/>
+          <a:p>
+            <a:fld id="{5024BDE3-6F31-4F50-B9DA-C06DE42B7D2E}" type="slidenum">
+              <a:rPr lang="de-DE" smtClean="0"/>
+              <a:t>3</a:t>
+            </a:fld>
+            <a:endParaRPr lang="de-DE"/>
+          </a:p>
+        </p:txBody>
+      </p:sp>
+    </p:spTree>
+    <p:extLst>
+      <p:ext uri="{BB962C8B-B14F-4D97-AF65-F5344CB8AC3E}">
+        <p14:creationId xmlns:p14="http://schemas.microsoft.com/office/powerpoint/2010/main" val="2256448155"/>
+      </p:ext>
+    </p:extLst>
+  </p:cSld>
+  <p:clrMapOvr>
+    <a:masterClrMapping/>
+  </p:clrMapOvr>
+</p:notes>
+</file>
+
+<file path=ppt/notesSlides/notesSlide4.xml><?xml version="1.0" encoding="utf-8"?>
+<p:notes xmlns:a="http://schemas.openxmlformats.org/drawingml/2006/main" xmlns:r="http://schemas.openxmlformats.org/officeDocument/2006/relationships" xmlns:p="http://schemas.openxmlformats.org/presentationml/2006/main">
+  <p:cSld>
+    <p:spTree>
+      <p:nvGrpSpPr>
+        <p:cNvPr id="1" name=""/>
+        <p:cNvGrpSpPr/>
+        <p:nvPr/>
+      </p:nvGrpSpPr>
+      <p:grpSpPr>
+        <a:xfrm>
+          <a:off x="0" y="0"/>
+          <a:ext cx="0" cy="0"/>
+          <a:chOff x="0" y="0"/>
+          <a:chExt cx="0" cy="0"/>
+        </a:xfrm>
+      </p:grpSpPr>
+      <p:sp>
+        <p:nvSpPr>
+          <p:cNvPr id="2" name="Slide Image Placeholder 1"/>
+          <p:cNvSpPr>
+            <a:spLocks noGrp="1" noRot="1" noChangeAspect="1"/>
+          </p:cNvSpPr>
+          <p:nvPr>
+            <p:ph type="sldImg"/>
+          </p:nvPr>
+        </p:nvSpPr>
+        <p:spPr/>
+      </p:sp>
+      <p:sp>
+        <p:nvSpPr>
+          <p:cNvPr id="3" name="Notes Placeholder 2"/>
+          <p:cNvSpPr>
+            <a:spLocks noGrp="1"/>
+          </p:cNvSpPr>
+          <p:nvPr>
+            <p:ph type="body" idx="1"/>
+          </p:nvPr>
+        </p:nvSpPr>
+        <p:spPr/>
+        <p:txBody>
+          <a:bodyPr/>
+          <a:lstStyle/>
+          <a:p>
+            <a:r>
+              <a:rPr lang="de-DE" dirty="0"/>
+              <a:t>The AI </a:t>
+            </a:r>
+            <a:r>
+              <a:rPr lang="de-DE" dirty="0" err="1"/>
+              <a:t>has</a:t>
+            </a:r>
+            <a:r>
+              <a:rPr lang="de-DE" dirty="0"/>
+              <a:t> </a:t>
+            </a:r>
+            <a:r>
+              <a:rPr lang="de-DE" dirty="0" err="1"/>
+              <a:t>some</a:t>
+            </a:r>
+            <a:r>
+              <a:rPr lang="de-DE" dirty="0"/>
+              <a:t> </a:t>
+            </a:r>
+            <a:r>
+              <a:rPr lang="de-DE" dirty="0" err="1"/>
+              <a:t>problems</a:t>
+            </a:r>
+            <a:r>
+              <a:rPr lang="de-DE" dirty="0"/>
+              <a:t>. </a:t>
+            </a:r>
+          </a:p>
+          <a:p>
+            <a:r>
+              <a:rPr lang="de-DE" dirty="0" err="1"/>
+              <a:t>For</a:t>
+            </a:r>
+            <a:r>
+              <a:rPr lang="de-DE" dirty="0"/>
+              <a:t> </a:t>
+            </a:r>
+            <a:r>
+              <a:rPr lang="de-DE" dirty="0" err="1"/>
+              <a:t>example</a:t>
+            </a:r>
+            <a:r>
+              <a:rPr lang="de-DE" dirty="0"/>
+              <a:t> </a:t>
+            </a:r>
+            <a:r>
+              <a:rPr lang="de-DE" dirty="0" err="1"/>
+              <a:t>it</a:t>
+            </a:r>
+            <a:r>
+              <a:rPr lang="de-DE" dirty="0"/>
+              <a:t> </a:t>
+            </a:r>
+            <a:r>
+              <a:rPr lang="de-DE" dirty="0" err="1"/>
+              <a:t>spits</a:t>
+            </a:r>
+            <a:r>
+              <a:rPr lang="de-DE" dirty="0"/>
+              <a:t> out </a:t>
+            </a:r>
+            <a:r>
+              <a:rPr lang="de-DE" dirty="0" err="1"/>
+              <a:t>the</a:t>
+            </a:r>
+            <a:r>
+              <a:rPr lang="de-DE" dirty="0"/>
+              <a:t> same </a:t>
+            </a:r>
+            <a:r>
+              <a:rPr lang="de-DE" dirty="0" err="1"/>
+              <a:t>sequence</a:t>
+            </a:r>
+            <a:r>
+              <a:rPr lang="de-DE" dirty="0"/>
+              <a:t> </a:t>
+            </a:r>
+            <a:r>
+              <a:rPr lang="de-DE" dirty="0" err="1"/>
+              <a:t>of</a:t>
+            </a:r>
+            <a:r>
+              <a:rPr lang="de-DE" dirty="0"/>
+              <a:t> </a:t>
+            </a:r>
+            <a:r>
+              <a:rPr lang="de-DE" dirty="0" err="1"/>
+              <a:t>words</a:t>
+            </a:r>
+            <a:r>
+              <a:rPr lang="de-DE" dirty="0"/>
+              <a:t> </a:t>
+            </a:r>
+            <a:r>
+              <a:rPr lang="de-DE" dirty="0" err="1"/>
+              <a:t>over</a:t>
+            </a:r>
+            <a:r>
+              <a:rPr lang="de-DE" dirty="0"/>
+              <a:t> and </a:t>
+            </a:r>
+            <a:r>
+              <a:rPr lang="de-DE" dirty="0" err="1"/>
+              <a:t>over</a:t>
+            </a:r>
+            <a:r>
+              <a:rPr lang="de-DE" dirty="0"/>
+              <a:t> </a:t>
+            </a:r>
+            <a:r>
+              <a:rPr lang="de-DE" dirty="0" err="1"/>
+              <a:t>again</a:t>
+            </a:r>
+            <a:r>
+              <a:rPr lang="de-DE" dirty="0"/>
+              <a:t>, </a:t>
+            </a:r>
+            <a:r>
+              <a:rPr lang="de-DE" dirty="0" err="1"/>
+              <a:t>whenever</a:t>
+            </a:r>
+            <a:r>
+              <a:rPr lang="de-DE" dirty="0"/>
+              <a:t> I </a:t>
+            </a:r>
+            <a:r>
+              <a:rPr lang="de-DE" dirty="0" err="1"/>
+              <a:t>saw</a:t>
+            </a:r>
+            <a:r>
+              <a:rPr lang="de-DE" dirty="0"/>
+              <a:t> break, </a:t>
+            </a:r>
+            <a:r>
+              <a:rPr lang="de-DE" dirty="0" err="1"/>
+              <a:t>the</a:t>
+            </a:r>
+            <a:r>
+              <a:rPr lang="de-DE" dirty="0"/>
+              <a:t> </a:t>
+            </a:r>
+            <a:r>
+              <a:rPr lang="de-DE" dirty="0" err="1"/>
+              <a:t>following</a:t>
+            </a:r>
+            <a:r>
+              <a:rPr lang="de-DE" dirty="0"/>
+              <a:t> </a:t>
+            </a:r>
+            <a:r>
+              <a:rPr lang="de-DE" dirty="0" err="1"/>
+              <a:t>words</a:t>
+            </a:r>
+            <a:r>
+              <a:rPr lang="de-DE" dirty="0"/>
+              <a:t> where </a:t>
+            </a:r>
+            <a:r>
+              <a:rPr lang="de-DE" dirty="0" err="1"/>
+              <a:t>wherever</a:t>
+            </a:r>
+            <a:r>
+              <a:rPr lang="de-DE" dirty="0"/>
+              <a:t> </a:t>
+            </a:r>
+            <a:r>
+              <a:rPr lang="de-DE" dirty="0" err="1"/>
+              <a:t>it</a:t>
+            </a:r>
+            <a:r>
+              <a:rPr lang="de-DE" dirty="0"/>
+              <a:t> was.</a:t>
+            </a:r>
+          </a:p>
+          <a:p>
+            <a:r>
+              <a:rPr lang="de-DE" dirty="0"/>
+              <a:t>This </a:t>
+            </a:r>
+            <a:r>
+              <a:rPr lang="de-DE" dirty="0" err="1"/>
+              <a:t>might</a:t>
+            </a:r>
+            <a:r>
+              <a:rPr lang="de-DE" dirty="0"/>
+              <a:t> </a:t>
+            </a:r>
+            <a:r>
+              <a:rPr lang="de-DE" dirty="0" err="1"/>
+              <a:t>be</a:t>
+            </a:r>
+            <a:r>
+              <a:rPr lang="de-DE" dirty="0"/>
+              <a:t> </a:t>
+            </a:r>
+            <a:r>
+              <a:rPr lang="de-DE" dirty="0" err="1"/>
+              <a:t>fixed</a:t>
+            </a:r>
+            <a:r>
+              <a:rPr lang="de-DE" dirty="0"/>
+              <a:t> </a:t>
+            </a:r>
+            <a:r>
+              <a:rPr lang="de-DE" dirty="0" err="1"/>
+              <a:t>with</a:t>
+            </a:r>
+            <a:r>
+              <a:rPr lang="de-DE" dirty="0"/>
+              <a:t> </a:t>
+            </a:r>
+            <a:r>
+              <a:rPr lang="de-DE" dirty="0" err="1"/>
+              <a:t>more</a:t>
+            </a:r>
+            <a:r>
+              <a:rPr lang="de-DE" dirty="0"/>
+              <a:t> </a:t>
+            </a:r>
+            <a:r>
+              <a:rPr lang="de-DE" dirty="0" err="1"/>
+              <a:t>data</a:t>
+            </a:r>
+            <a:r>
+              <a:rPr lang="de-DE" dirty="0"/>
+              <a:t>, so </a:t>
+            </a:r>
+            <a:r>
+              <a:rPr lang="de-DE" dirty="0" err="1"/>
+              <a:t>the</a:t>
+            </a:r>
+            <a:r>
+              <a:rPr lang="de-DE" dirty="0"/>
+              <a:t> AI </a:t>
+            </a:r>
+            <a:r>
+              <a:rPr lang="de-DE" dirty="0" err="1"/>
+              <a:t>learns</a:t>
+            </a:r>
+            <a:r>
+              <a:rPr lang="de-DE" dirty="0"/>
+              <a:t> </a:t>
+            </a:r>
+            <a:r>
+              <a:rPr lang="de-DE" dirty="0" err="1"/>
+              <a:t>that</a:t>
+            </a:r>
+            <a:r>
+              <a:rPr lang="de-DE" dirty="0"/>
+              <a:t> </a:t>
+            </a:r>
+            <a:r>
+              <a:rPr lang="de-DE" dirty="0" err="1"/>
+              <a:t>these</a:t>
+            </a:r>
+            <a:r>
+              <a:rPr lang="de-DE" dirty="0"/>
+              <a:t> </a:t>
+            </a:r>
+            <a:r>
+              <a:rPr lang="de-DE" dirty="0" err="1"/>
+              <a:t>words</a:t>
+            </a:r>
+            <a:r>
+              <a:rPr lang="de-DE" dirty="0"/>
+              <a:t> </a:t>
+            </a:r>
+            <a:r>
+              <a:rPr lang="de-DE" dirty="0" err="1"/>
+              <a:t>don‘t</a:t>
+            </a:r>
+            <a:r>
+              <a:rPr lang="de-DE" dirty="0"/>
+              <a:t> </a:t>
+            </a:r>
+            <a:r>
+              <a:rPr lang="de-DE" dirty="0" err="1"/>
+              <a:t>have</a:t>
+            </a:r>
+            <a:r>
+              <a:rPr lang="de-DE" dirty="0"/>
+              <a:t> </a:t>
+            </a:r>
+            <a:r>
+              <a:rPr lang="de-DE" dirty="0" err="1"/>
+              <a:t>to</a:t>
+            </a:r>
+            <a:r>
+              <a:rPr lang="de-DE" dirty="0"/>
+              <a:t> </a:t>
+            </a:r>
+            <a:r>
+              <a:rPr lang="de-DE" dirty="0" err="1"/>
+              <a:t>appear</a:t>
+            </a:r>
+            <a:r>
+              <a:rPr lang="de-DE" dirty="0"/>
+              <a:t> </a:t>
+            </a:r>
+            <a:r>
+              <a:rPr lang="de-DE" dirty="0" err="1"/>
+              <a:t>together</a:t>
+            </a:r>
+            <a:r>
+              <a:rPr lang="de-DE" dirty="0"/>
+              <a:t>.</a:t>
+            </a:r>
+          </a:p>
+          <a:p>
+            <a:r>
+              <a:rPr lang="de-DE" dirty="0"/>
+              <a:t>I also </a:t>
+            </a:r>
+            <a:r>
+              <a:rPr lang="de-DE" dirty="0" err="1"/>
+              <a:t>sometimes</a:t>
+            </a:r>
+            <a:r>
+              <a:rPr lang="de-DE" dirty="0"/>
+              <a:t> </a:t>
+            </a:r>
+            <a:r>
+              <a:rPr lang="de-DE" dirty="0" err="1"/>
+              <a:t>get</a:t>
+            </a:r>
+            <a:r>
+              <a:rPr lang="de-DE" dirty="0"/>
+              <a:t> an s </a:t>
+            </a:r>
+            <a:r>
+              <a:rPr lang="de-DE" dirty="0" err="1"/>
+              <a:t>or</a:t>
+            </a:r>
+            <a:r>
+              <a:rPr lang="de-DE" dirty="0"/>
+              <a:t> a t in </a:t>
+            </a:r>
+            <a:r>
+              <a:rPr lang="de-DE" dirty="0" err="1"/>
+              <a:t>the</a:t>
+            </a:r>
+            <a:r>
+              <a:rPr lang="de-DE" dirty="0"/>
+              <a:t> </a:t>
+            </a:r>
+            <a:r>
+              <a:rPr lang="de-DE" dirty="0" err="1"/>
+              <a:t>middle</a:t>
+            </a:r>
+            <a:r>
+              <a:rPr lang="de-DE" dirty="0"/>
+              <a:t> </a:t>
+            </a:r>
+            <a:r>
+              <a:rPr lang="de-DE" dirty="0" err="1"/>
+              <a:t>of</a:t>
+            </a:r>
+            <a:r>
+              <a:rPr lang="de-DE" dirty="0"/>
+              <a:t> </a:t>
+            </a:r>
+            <a:r>
+              <a:rPr lang="de-DE" dirty="0" err="1"/>
+              <a:t>the</a:t>
+            </a:r>
+            <a:r>
+              <a:rPr lang="de-DE" dirty="0"/>
+              <a:t> </a:t>
+            </a:r>
+            <a:r>
+              <a:rPr lang="de-DE" dirty="0" err="1"/>
+              <a:t>sentence</a:t>
+            </a:r>
+            <a:r>
+              <a:rPr lang="de-DE" dirty="0"/>
+              <a:t>. This </a:t>
+            </a:r>
+            <a:r>
+              <a:rPr lang="de-DE" dirty="0" err="1"/>
+              <a:t>is</a:t>
+            </a:r>
+            <a:r>
+              <a:rPr lang="de-DE" dirty="0"/>
+              <a:t> due </a:t>
+            </a:r>
+            <a:r>
+              <a:rPr lang="de-DE" dirty="0" err="1"/>
+              <a:t>to</a:t>
+            </a:r>
+            <a:r>
+              <a:rPr lang="de-DE" dirty="0"/>
+              <a:t> </a:t>
+            </a:r>
+            <a:r>
+              <a:rPr lang="de-DE" dirty="0" err="1"/>
+              <a:t>my</a:t>
+            </a:r>
+            <a:r>
+              <a:rPr lang="de-DE" dirty="0"/>
+              <a:t> </a:t>
+            </a:r>
+            <a:r>
+              <a:rPr lang="de-DE" dirty="0" err="1"/>
+              <a:t>data</a:t>
+            </a:r>
+            <a:r>
+              <a:rPr lang="de-DE" dirty="0"/>
+              <a:t> </a:t>
+            </a:r>
+            <a:r>
+              <a:rPr lang="de-DE" dirty="0" err="1"/>
+              <a:t>cleaning</a:t>
+            </a:r>
+            <a:r>
+              <a:rPr lang="de-DE" dirty="0"/>
+              <a:t>. I </a:t>
+            </a:r>
+            <a:r>
+              <a:rPr lang="de-DE" dirty="0" err="1"/>
+              <a:t>removed</a:t>
+            </a:r>
+            <a:r>
+              <a:rPr lang="de-DE" dirty="0"/>
+              <a:t> </a:t>
+            </a:r>
+            <a:r>
+              <a:rPr lang="de-DE" dirty="0" err="1"/>
+              <a:t>the</a:t>
+            </a:r>
+            <a:r>
+              <a:rPr lang="de-DE" dirty="0"/>
+              <a:t> </a:t>
+            </a:r>
+            <a:r>
+              <a:rPr lang="de-DE" dirty="0" err="1"/>
+              <a:t>apostrophe</a:t>
+            </a:r>
+            <a:r>
+              <a:rPr lang="de-DE" dirty="0"/>
+              <a:t>. </a:t>
+            </a:r>
+            <a:r>
+              <a:rPr lang="de-DE" dirty="0" err="1"/>
+              <a:t>Should</a:t>
+            </a:r>
+            <a:r>
+              <a:rPr lang="de-DE" dirty="0"/>
+              <a:t> </a:t>
+            </a:r>
+            <a:r>
+              <a:rPr lang="de-DE" dirty="0" err="1"/>
+              <a:t>go</a:t>
+            </a:r>
+            <a:r>
+              <a:rPr lang="de-DE" dirty="0"/>
+              <a:t> back </a:t>
+            </a:r>
+            <a:r>
+              <a:rPr lang="de-DE" dirty="0" err="1"/>
+              <a:t>to</a:t>
+            </a:r>
+            <a:r>
+              <a:rPr lang="de-DE" dirty="0"/>
+              <a:t> </a:t>
+            </a:r>
+            <a:r>
+              <a:rPr lang="de-DE" dirty="0" err="1"/>
+              <a:t>the</a:t>
+            </a:r>
+            <a:r>
+              <a:rPr lang="de-DE" dirty="0"/>
+              <a:t> </a:t>
+            </a:r>
+            <a:r>
+              <a:rPr lang="de-DE" dirty="0" err="1"/>
+              <a:t>cleaning</a:t>
+            </a:r>
+            <a:r>
+              <a:rPr lang="de-DE" dirty="0"/>
+              <a:t> and fix </a:t>
+            </a:r>
+            <a:r>
+              <a:rPr lang="de-DE" dirty="0" err="1"/>
+              <a:t>this</a:t>
+            </a:r>
+            <a:endParaRPr lang="de-DE" dirty="0"/>
+          </a:p>
+          <a:p>
+            <a:r>
+              <a:rPr lang="de-DE" dirty="0"/>
+              <a:t>A </a:t>
+            </a:r>
+            <a:r>
+              <a:rPr lang="de-DE" dirty="0" err="1"/>
+              <a:t>systematic</a:t>
+            </a:r>
+            <a:r>
+              <a:rPr lang="de-DE" dirty="0"/>
+              <a:t> </a:t>
+            </a:r>
+            <a:r>
+              <a:rPr lang="de-DE" dirty="0" err="1"/>
+              <a:t>error</a:t>
+            </a:r>
+            <a:r>
+              <a:rPr lang="de-DE" dirty="0"/>
+              <a:t> </a:t>
+            </a:r>
+            <a:r>
+              <a:rPr lang="de-DE" dirty="0" err="1"/>
+              <a:t>is</a:t>
+            </a:r>
+            <a:r>
+              <a:rPr lang="de-DE" dirty="0"/>
+              <a:t>, </a:t>
+            </a:r>
+            <a:r>
+              <a:rPr lang="de-DE" dirty="0" err="1"/>
+              <a:t>that</a:t>
+            </a:r>
+            <a:r>
+              <a:rPr lang="de-DE" dirty="0"/>
+              <a:t> </a:t>
+            </a:r>
+            <a:r>
+              <a:rPr lang="de-DE" dirty="0" err="1"/>
+              <a:t>the</a:t>
+            </a:r>
+            <a:r>
+              <a:rPr lang="de-DE" dirty="0"/>
+              <a:t> AI </a:t>
+            </a:r>
+            <a:r>
+              <a:rPr lang="de-DE" dirty="0" err="1"/>
+              <a:t>doesn‘t</a:t>
+            </a:r>
+            <a:r>
+              <a:rPr lang="de-DE" dirty="0"/>
+              <a:t> </a:t>
+            </a:r>
+            <a:r>
+              <a:rPr lang="de-DE" dirty="0" err="1"/>
+              <a:t>know</a:t>
+            </a:r>
+            <a:r>
+              <a:rPr lang="de-DE" dirty="0"/>
+              <a:t> </a:t>
+            </a:r>
+            <a:r>
+              <a:rPr lang="de-DE" dirty="0" err="1"/>
+              <a:t>sentences</a:t>
+            </a:r>
+            <a:r>
+              <a:rPr lang="de-DE" dirty="0"/>
+              <a:t>, so </a:t>
+            </a:r>
+            <a:r>
+              <a:rPr lang="de-DE" dirty="0" err="1"/>
+              <a:t>sometimes</a:t>
+            </a:r>
+            <a:r>
+              <a:rPr lang="de-DE" dirty="0"/>
+              <a:t> </a:t>
+            </a:r>
+            <a:r>
+              <a:rPr lang="de-DE" dirty="0" err="1"/>
+              <a:t>it</a:t>
+            </a:r>
+            <a:r>
+              <a:rPr lang="de-DE" dirty="0"/>
+              <a:t> </a:t>
+            </a:r>
+            <a:r>
+              <a:rPr lang="de-DE" dirty="0" err="1"/>
+              <a:t>breaks</a:t>
+            </a:r>
+            <a:r>
+              <a:rPr lang="de-DE" dirty="0"/>
+              <a:t> off in </a:t>
+            </a:r>
+            <a:r>
+              <a:rPr lang="de-DE" dirty="0" err="1"/>
+              <a:t>the</a:t>
+            </a:r>
+            <a:r>
+              <a:rPr lang="de-DE" dirty="0"/>
+              <a:t> </a:t>
+            </a:r>
+            <a:r>
+              <a:rPr lang="de-DE" dirty="0" err="1"/>
+              <a:t>middle</a:t>
+            </a:r>
+            <a:r>
+              <a:rPr lang="de-DE" dirty="0"/>
+              <a:t> </a:t>
+            </a:r>
+            <a:r>
+              <a:rPr lang="de-DE" dirty="0" err="1"/>
+              <a:t>of</a:t>
+            </a:r>
+            <a:r>
+              <a:rPr lang="de-DE" dirty="0"/>
+              <a:t> a </a:t>
+            </a:r>
+            <a:r>
+              <a:rPr lang="de-DE" dirty="0" err="1"/>
+              <a:t>sentence</a:t>
+            </a:r>
+            <a:endParaRPr lang="de-DE" dirty="0"/>
+          </a:p>
+        </p:txBody>
+      </p:sp>
+      <p:sp>
+        <p:nvSpPr>
+          <p:cNvPr id="4" name="Slide Number Placeholder 3"/>
+          <p:cNvSpPr>
+            <a:spLocks noGrp="1"/>
+          </p:cNvSpPr>
+          <p:nvPr>
+            <p:ph type="sldNum" sz="quarter" idx="5"/>
+          </p:nvPr>
+        </p:nvSpPr>
+        <p:spPr/>
+        <p:txBody>
+          <a:bodyPr/>
+          <a:lstStyle/>
+          <a:p>
+            <a:fld id="{5024BDE3-6F31-4F50-B9DA-C06DE42B7D2E}" type="slidenum">
+              <a:rPr lang="de-DE" smtClean="0"/>
+              <a:t>5</a:t>
+            </a:fld>
+            <a:endParaRPr lang="de-DE"/>
+          </a:p>
+        </p:txBody>
+      </p:sp>
+    </p:spTree>
+    <p:extLst>
+      <p:ext uri="{BB962C8B-B14F-4D97-AF65-F5344CB8AC3E}">
+        <p14:creationId xmlns:p14="http://schemas.microsoft.com/office/powerpoint/2010/main" val="882463382"/>
+      </p:ext>
+    </p:extLst>
+  </p:cSld>
+  <p:clrMapOvr>
+    <a:masterClrMapping/>
+  </p:clrMapOvr>
+</p:notes>
+</file>
+
+<file path=ppt/notesSlides/notesSlide5.xml><?xml version="1.0" encoding="utf-8"?>
+<p:notes xmlns:a="http://schemas.openxmlformats.org/drawingml/2006/main" xmlns:r="http://schemas.openxmlformats.org/officeDocument/2006/relationships" xmlns:p="http://schemas.openxmlformats.org/presentationml/2006/main">
+  <p:cSld>
+    <p:spTree>
+      <p:nvGrpSpPr>
+        <p:cNvPr id="1" name=""/>
+        <p:cNvGrpSpPr/>
+        <p:nvPr/>
+      </p:nvGrpSpPr>
+      <p:grpSpPr>
+        <a:xfrm>
+          <a:off x="0" y="0"/>
+          <a:ext cx="0" cy="0"/>
+          <a:chOff x="0" y="0"/>
+          <a:chExt cx="0" cy="0"/>
+        </a:xfrm>
+      </p:grpSpPr>
+      <p:sp>
+        <p:nvSpPr>
+          <p:cNvPr id="2" name="Slide Image Placeholder 1"/>
+          <p:cNvSpPr>
+            <a:spLocks noGrp="1" noRot="1" noChangeAspect="1"/>
+          </p:cNvSpPr>
+          <p:nvPr>
+            <p:ph type="sldImg"/>
+          </p:nvPr>
+        </p:nvSpPr>
+        <p:spPr/>
+      </p:sp>
+      <p:sp>
+        <p:nvSpPr>
+          <p:cNvPr id="3" name="Notes Placeholder 2"/>
+          <p:cNvSpPr>
+            <a:spLocks noGrp="1"/>
+          </p:cNvSpPr>
+          <p:nvPr>
+            <p:ph type="body" idx="1"/>
+          </p:nvPr>
+        </p:nvSpPr>
+        <p:spPr/>
+        <p:txBody>
+          <a:bodyPr/>
+          <a:lstStyle/>
+          <a:p>
+            <a:r>
+              <a:rPr lang="de-DE" dirty="0"/>
+              <a:t>So </a:t>
+            </a:r>
+            <a:r>
+              <a:rPr lang="de-DE" dirty="0" err="1"/>
+              <a:t>although</a:t>
+            </a:r>
+            <a:r>
+              <a:rPr lang="de-DE" dirty="0"/>
+              <a:t> </a:t>
+            </a:r>
+            <a:r>
+              <a:rPr lang="de-DE" dirty="0" err="1"/>
+              <a:t>my</a:t>
+            </a:r>
+            <a:r>
+              <a:rPr lang="de-DE" dirty="0"/>
+              <a:t> AI </a:t>
+            </a:r>
+            <a:r>
+              <a:rPr lang="de-DE" dirty="0" err="1"/>
+              <a:t>has</a:t>
+            </a:r>
+            <a:r>
+              <a:rPr lang="de-DE" dirty="0"/>
+              <a:t> </a:t>
+            </a:r>
+            <a:r>
+              <a:rPr lang="de-DE" dirty="0" err="1"/>
+              <a:t>some</a:t>
+            </a:r>
+            <a:r>
+              <a:rPr lang="de-DE" dirty="0"/>
+              <a:t> </a:t>
+            </a:r>
+            <a:r>
+              <a:rPr lang="de-DE" dirty="0" err="1"/>
+              <a:t>issues</a:t>
+            </a:r>
+            <a:r>
+              <a:rPr lang="de-DE" dirty="0"/>
+              <a:t>, </a:t>
+            </a:r>
+            <a:r>
+              <a:rPr lang="de-DE" dirty="0" err="1"/>
+              <a:t>it</a:t>
+            </a:r>
+            <a:r>
+              <a:rPr lang="de-DE" dirty="0"/>
+              <a:t> </a:t>
+            </a:r>
+            <a:r>
+              <a:rPr lang="de-DE" dirty="0" err="1"/>
+              <a:t>is</a:t>
+            </a:r>
+            <a:r>
+              <a:rPr lang="de-DE" dirty="0"/>
+              <a:t> </a:t>
+            </a:r>
+            <a:r>
+              <a:rPr lang="de-DE" dirty="0" err="1"/>
+              <a:t>doing</a:t>
+            </a:r>
+            <a:r>
+              <a:rPr lang="de-DE" dirty="0"/>
+              <a:t> a </a:t>
+            </a:r>
+            <a:r>
+              <a:rPr lang="de-DE" dirty="0" err="1"/>
+              <a:t>great</a:t>
+            </a:r>
+            <a:r>
+              <a:rPr lang="de-DE" dirty="0"/>
+              <a:t> </a:t>
+            </a:r>
+            <a:r>
+              <a:rPr lang="de-DE" dirty="0" err="1"/>
+              <a:t>job</a:t>
+            </a:r>
+            <a:r>
+              <a:rPr lang="de-DE" dirty="0"/>
+              <a:t>!</a:t>
+            </a:r>
+          </a:p>
+          <a:p>
+            <a:r>
+              <a:rPr lang="de-DE" dirty="0"/>
+              <a:t>Here I </a:t>
+            </a:r>
+            <a:r>
+              <a:rPr lang="de-DE" dirty="0" err="1"/>
+              <a:t>put</a:t>
+            </a:r>
+            <a:r>
+              <a:rPr lang="de-DE" dirty="0"/>
+              <a:t> a ‚</a:t>
+            </a:r>
+            <a:r>
+              <a:rPr lang="de-DE" dirty="0" err="1"/>
+              <a:t>poem</a:t>
+            </a:r>
+            <a:r>
+              <a:rPr lang="de-DE" dirty="0"/>
+              <a:t>‘, where I </a:t>
+            </a:r>
+            <a:r>
+              <a:rPr lang="de-DE" dirty="0" err="1"/>
+              <a:t>created</a:t>
+            </a:r>
+            <a:r>
+              <a:rPr lang="de-DE" dirty="0"/>
+              <a:t> a </a:t>
+            </a:r>
+            <a:r>
+              <a:rPr lang="de-DE" dirty="0" err="1"/>
+              <a:t>random</a:t>
+            </a:r>
+            <a:r>
+              <a:rPr lang="de-DE" dirty="0"/>
+              <a:t> </a:t>
+            </a:r>
+            <a:r>
+              <a:rPr lang="de-DE" dirty="0" err="1"/>
+              <a:t>output</a:t>
+            </a:r>
+            <a:r>
+              <a:rPr lang="de-DE" dirty="0"/>
+              <a:t> </a:t>
+            </a:r>
+            <a:r>
+              <a:rPr lang="de-DE" dirty="0" err="1"/>
+              <a:t>from</a:t>
+            </a:r>
+            <a:r>
+              <a:rPr lang="de-DE" dirty="0"/>
+              <a:t> </a:t>
+            </a:r>
+            <a:r>
+              <a:rPr lang="de-DE" dirty="0" err="1"/>
+              <a:t>the</a:t>
+            </a:r>
+            <a:r>
+              <a:rPr lang="de-DE" dirty="0"/>
+              <a:t> same </a:t>
+            </a:r>
+            <a:r>
+              <a:rPr lang="de-DE" dirty="0" err="1"/>
+              <a:t>vocabulary</a:t>
+            </a:r>
+            <a:r>
+              <a:rPr lang="de-DE" dirty="0"/>
+              <a:t> </a:t>
+            </a:r>
+            <a:r>
+              <a:rPr lang="de-DE" dirty="0" err="1"/>
+              <a:t>as</a:t>
+            </a:r>
+            <a:r>
+              <a:rPr lang="de-DE" dirty="0"/>
+              <a:t> </a:t>
+            </a:r>
+            <a:r>
+              <a:rPr lang="de-DE" dirty="0" err="1"/>
+              <a:t>the</a:t>
+            </a:r>
+            <a:r>
+              <a:rPr lang="de-DE" dirty="0"/>
+              <a:t> AI </a:t>
+            </a:r>
+            <a:r>
+              <a:rPr lang="de-DE" dirty="0" err="1"/>
+              <a:t>used</a:t>
+            </a:r>
+            <a:r>
+              <a:rPr lang="de-DE" dirty="0"/>
+              <a:t> and in </a:t>
+            </a:r>
+            <a:r>
+              <a:rPr lang="de-DE" dirty="0" err="1"/>
+              <a:t>comparison</a:t>
+            </a:r>
+            <a:r>
+              <a:rPr lang="de-DE" dirty="0"/>
+              <a:t> </a:t>
+            </a:r>
+            <a:r>
+              <a:rPr lang="de-DE" dirty="0" err="1"/>
+              <a:t>another</a:t>
+            </a:r>
+            <a:r>
+              <a:rPr lang="de-DE" dirty="0"/>
+              <a:t> </a:t>
+            </a:r>
+            <a:r>
+              <a:rPr lang="de-DE" dirty="0" err="1"/>
+              <a:t>output</a:t>
+            </a:r>
+            <a:r>
+              <a:rPr lang="de-DE" dirty="0"/>
+              <a:t> </a:t>
+            </a:r>
+            <a:r>
+              <a:rPr lang="de-DE" dirty="0" err="1"/>
+              <a:t>from</a:t>
+            </a:r>
+            <a:r>
+              <a:rPr lang="de-DE" dirty="0"/>
+              <a:t> </a:t>
+            </a:r>
+            <a:r>
+              <a:rPr lang="de-DE" dirty="0" err="1"/>
+              <a:t>my</a:t>
+            </a:r>
+            <a:r>
+              <a:rPr lang="de-DE" dirty="0"/>
+              <a:t> AI, </a:t>
+            </a:r>
+            <a:r>
+              <a:rPr lang="de-DE" dirty="0" err="1"/>
+              <a:t>that</a:t>
+            </a:r>
+            <a:r>
+              <a:rPr lang="de-DE" dirty="0"/>
+              <a:t> I </a:t>
+            </a:r>
+            <a:r>
+              <a:rPr lang="de-DE" dirty="0" err="1"/>
+              <a:t>liked</a:t>
+            </a:r>
+            <a:r>
+              <a:rPr lang="de-DE" dirty="0"/>
+              <a:t>.</a:t>
+            </a:r>
+          </a:p>
+          <a:p>
+            <a:r>
+              <a:rPr lang="de-DE" dirty="0"/>
+              <a:t>I will </a:t>
+            </a:r>
+            <a:r>
+              <a:rPr lang="de-DE" dirty="0" err="1"/>
+              <a:t>read</a:t>
+            </a:r>
+            <a:r>
+              <a:rPr lang="de-DE" dirty="0"/>
+              <a:t> </a:t>
+            </a:r>
+            <a:r>
+              <a:rPr lang="de-DE" dirty="0" err="1"/>
+              <a:t>them</a:t>
+            </a:r>
+            <a:r>
+              <a:rPr lang="de-DE" dirty="0"/>
+              <a:t>…</a:t>
+            </a:r>
+          </a:p>
+        </p:txBody>
+      </p:sp>
+      <p:sp>
+        <p:nvSpPr>
+          <p:cNvPr id="4" name="Slide Number Placeholder 3"/>
+          <p:cNvSpPr>
+            <a:spLocks noGrp="1"/>
+          </p:cNvSpPr>
+          <p:nvPr>
+            <p:ph type="sldNum" sz="quarter" idx="5"/>
+          </p:nvPr>
+        </p:nvSpPr>
+        <p:spPr/>
+        <p:txBody>
+          <a:bodyPr/>
+          <a:lstStyle/>
+          <a:p>
+            <a:fld id="{5024BDE3-6F31-4F50-B9DA-C06DE42B7D2E}" type="slidenum">
+              <a:rPr lang="de-DE" smtClean="0"/>
+              <a:t>6</a:t>
+            </a:fld>
+            <a:endParaRPr lang="de-DE"/>
+          </a:p>
+        </p:txBody>
+      </p:sp>
+    </p:spTree>
+    <p:extLst>
+      <p:ext uri="{BB962C8B-B14F-4D97-AF65-F5344CB8AC3E}">
+        <p14:creationId xmlns:p14="http://schemas.microsoft.com/office/powerpoint/2010/main" val="2760517006"/>
+      </p:ext>
+    </p:extLst>
+  </p:cSld>
+  <p:clrMapOvr>
+    <a:masterClrMapping/>
+  </p:clrMapOvr>
+</p:notes>
+</file>
+
+<file path=ppt/notesSlides/notesSlide6.xml><?xml version="1.0" encoding="utf-8"?>
+<p:notes xmlns:a="http://schemas.openxmlformats.org/drawingml/2006/main" xmlns:r="http://schemas.openxmlformats.org/officeDocument/2006/relationships" xmlns:p="http://schemas.openxmlformats.org/presentationml/2006/main">
+  <p:cSld>
+    <p:spTree>
+      <p:nvGrpSpPr>
+        <p:cNvPr id="1" name=""/>
+        <p:cNvGrpSpPr/>
+        <p:nvPr/>
+      </p:nvGrpSpPr>
+      <p:grpSpPr>
+        <a:xfrm>
+          <a:off x="0" y="0"/>
+          <a:ext cx="0" cy="0"/>
+          <a:chOff x="0" y="0"/>
+          <a:chExt cx="0" cy="0"/>
+        </a:xfrm>
+      </p:grpSpPr>
+      <p:sp>
+        <p:nvSpPr>
+          <p:cNvPr id="2" name="Slide Image Placeholder 1"/>
+          <p:cNvSpPr>
+            <a:spLocks noGrp="1" noRot="1" noChangeAspect="1"/>
+          </p:cNvSpPr>
+          <p:nvPr>
+            <p:ph type="sldImg"/>
+          </p:nvPr>
+        </p:nvSpPr>
+        <p:spPr/>
+      </p:sp>
+      <p:sp>
+        <p:nvSpPr>
+          <p:cNvPr id="3" name="Notes Placeholder 2"/>
+          <p:cNvSpPr>
+            <a:spLocks noGrp="1"/>
+          </p:cNvSpPr>
+          <p:nvPr>
+            <p:ph type="body" idx="1"/>
+          </p:nvPr>
+        </p:nvSpPr>
+        <p:spPr/>
+        <p:txBody>
+          <a:bodyPr/>
+          <a:lstStyle/>
+          <a:p>
+            <a:r>
+              <a:rPr lang="en-US" dirty="0"/>
+              <a:t>This brings me to the end of my presentation. Are there any questions? Or comments?</a:t>
+            </a:r>
+            <a:endParaRPr lang="de-DE" dirty="0"/>
+          </a:p>
+        </p:txBody>
+      </p:sp>
+      <p:sp>
+        <p:nvSpPr>
+          <p:cNvPr id="4" name="Slide Number Placeholder 3"/>
+          <p:cNvSpPr>
+            <a:spLocks noGrp="1"/>
+          </p:cNvSpPr>
+          <p:nvPr>
+            <p:ph type="sldNum" sz="quarter" idx="5"/>
+          </p:nvPr>
+        </p:nvSpPr>
+        <p:spPr/>
+        <p:txBody>
+          <a:bodyPr/>
+          <a:lstStyle/>
+          <a:p>
+            <a:fld id="{5024BDE3-6F31-4F50-B9DA-C06DE42B7D2E}" type="slidenum">
+              <a:rPr lang="de-DE" smtClean="0"/>
+              <a:t>7</a:t>
+            </a:fld>
+            <a:endParaRPr lang="de-DE"/>
+          </a:p>
+        </p:txBody>
+      </p:sp>
+    </p:spTree>
+    <p:extLst>
+      <p:ext uri="{BB962C8B-B14F-4D97-AF65-F5344CB8AC3E}">
+        <p14:creationId xmlns:p14="http://schemas.microsoft.com/office/powerpoint/2010/main" val="3702454987"/>
+      </p:ext>
+    </p:extLst>
+  </p:cSld>
+  <p:clrMapOvr>
+    <a:masterClrMapping/>
+  </p:clrMapOvr>
+</p:notes>
+</file>
+
 <file path=ppt/slideLayouts/slideLayout1.xml><?xml version="1.0" encoding="utf-8"?>
 <p:sldLayout xmlns:a="http://schemas.openxmlformats.org/drawingml/2006/main" xmlns:r="http://schemas.openxmlformats.org/officeDocument/2006/relationships" xmlns:p="http://schemas.openxmlformats.org/presentationml/2006/main" type="title" preserve="1">
   <p:cSld name="Title Slide">
@@ -247,7 +2910,7 @@
           <a:p>
             <a:fld id="{9184DA70-C731-4C70-880D-CCD4705E623C}" type="datetime1">
               <a:rPr lang="en-US" smtClean="0"/>
-              <a:t>8/11/2022</a:t>
+              <a:t>8/12/2022</a:t>
             </a:fld>
             <a:endParaRPr lang="en-US" dirty="0"/>
           </a:p>
@@ -417,7 +3080,7 @@
           <a:p>
             <a:fld id="{B612A279-0833-481D-8C56-F67FD0AC6C50}" type="datetime1">
               <a:rPr lang="en-US" smtClean="0"/>
-              <a:t>8/11/2022</a:t>
+              <a:t>8/12/2022</a:t>
             </a:fld>
             <a:endParaRPr lang="en-US" dirty="0"/>
           </a:p>
@@ -597,7 +3260,7 @@
           <a:p>
             <a:fld id="{6587DA83-5663-4C9C-B9AA-0B40A3DAFF81}" type="datetime1">
               <a:rPr lang="en-US" smtClean="0"/>
-              <a:t>8/11/2022</a:t>
+              <a:t>8/12/2022</a:t>
             </a:fld>
             <a:endParaRPr lang="en-US" dirty="0"/>
           </a:p>
@@ -767,7 +3430,7 @@
           <a:p>
             <a:fld id="{4BE1D723-8F53-4F53-90B0-1982A396982E}" type="datetime1">
               <a:rPr lang="en-US" smtClean="0"/>
-              <a:t>8/11/2022</a:t>
+              <a:t>8/12/2022</a:t>
             </a:fld>
             <a:endParaRPr lang="en-US" dirty="0"/>
           </a:p>
@@ -1013,7 +3676,7 @@
           <a:p>
             <a:fld id="{97669AF7-7BEB-44E4-9852-375E34362B5B}" type="datetime1">
               <a:rPr lang="en-US" smtClean="0"/>
-              <a:t>8/11/2022</a:t>
+              <a:t>8/12/2022</a:t>
             </a:fld>
             <a:endParaRPr lang="en-US" dirty="0"/>
           </a:p>
@@ -1245,7 +3908,7 @@
           <a:p>
             <a:fld id="{BAAAC38D-0552-4C82-B593-E6124DFADBE2}" type="datetime1">
               <a:rPr lang="en-US" smtClean="0"/>
-              <a:t>8/11/2022</a:t>
+              <a:t>8/12/2022</a:t>
             </a:fld>
             <a:endParaRPr lang="en-US" dirty="0"/>
           </a:p>
@@ -1612,7 +4275,7 @@
           <a:p>
             <a:fld id="{D9DF0F1C-5577-4ACB-BB62-DF8F3C494C7E}" type="datetime1">
               <a:rPr lang="en-US" smtClean="0"/>
-              <a:t>8/11/2022</a:t>
+              <a:t>8/12/2022</a:t>
             </a:fld>
             <a:endParaRPr lang="en-US" dirty="0"/>
           </a:p>
@@ -1730,7 +4393,7 @@
           <a:p>
             <a:fld id="{1775B394-D9F9-4F0C-B15D-605F45CB9E9F}" type="datetime1">
               <a:rPr lang="en-US" smtClean="0"/>
-              <a:t>8/11/2022</a:t>
+              <a:t>8/12/2022</a:t>
             </a:fld>
             <a:endParaRPr lang="en-US" dirty="0"/>
           </a:p>
@@ -1825,7 +4488,7 @@
           <a:p>
             <a:fld id="{39667345-2558-425A-8533-9BFDBCE15005}" type="datetime1">
               <a:rPr lang="en-US" smtClean="0"/>
-              <a:t>8/11/2022</a:t>
+              <a:t>8/12/2022</a:t>
             </a:fld>
             <a:endParaRPr lang="en-US" dirty="0"/>
           </a:p>
@@ -2102,7 +4765,7 @@
           <a:p>
             <a:fld id="{92BEA474-078D-4E9B-9B14-09A87B19DC46}" type="datetime1">
               <a:rPr lang="en-US" smtClean="0"/>
-              <a:t>8/11/2022</a:t>
+              <a:t>8/12/2022</a:t>
             </a:fld>
             <a:endParaRPr lang="en-US" dirty="0"/>
           </a:p>
@@ -2360,7 +5023,7 @@
           <a:p>
             <a:fld id="{4907D986-8816-4272-A432-0437A28A9828}" type="datetime1">
               <a:rPr lang="en-US" smtClean="0"/>
-              <a:t>8/11/2022</a:t>
+              <a:t>8/12/2022</a:t>
             </a:fld>
             <a:endParaRPr lang="en-US" dirty="0"/>
           </a:p>
@@ -2574,7 +5237,7 @@
           <a:p>
             <a:fld id="{62D6E202-B606-4609-B914-27C9371A1F6D}" type="datetime1">
               <a:rPr lang="en-US" smtClean="0"/>
-              <a:t>8/11/2022</a:t>
+              <a:t>8/12/2022</a:t>
             </a:fld>
             <a:endParaRPr lang="en-US" dirty="0"/>
           </a:p>
@@ -3019,7 +5682,7 @@
           <a:p>
             <a:pPr algn="l"/>
             <a:r>
-              <a:rPr lang="de-DE" sz="6600" dirty="0">
+              <a:rPr lang="de-DE" sz="6600" spc="300" dirty="0">
                 <a:latin typeface="Courier New" panose="02070309020205020404" pitchFamily="49" charset="0"/>
                 <a:cs typeface="Courier New" panose="02070309020205020404" pitchFamily="49" charset="0"/>
               </a:rPr>
@@ -3132,7 +5795,7 @@
           <p:nvPr/>
         </p:nvPicPr>
         <p:blipFill rotWithShape="1">
-          <a:blip r:embed="rId2">
+          <a:blip r:embed="rId3">
             <a:extLst>
               <a:ext uri="{28A0092B-C50C-407E-A947-70E740481C1C}">
                 <a14:useLocalDpi xmlns:a14="http://schemas.microsoft.com/office/drawing/2010/main" val="0"/>
@@ -3212,9 +5875,7 @@
     <p:bg>
       <p:bgPr>
         <a:solidFill>
-          <a:srgbClr val="4D6673">
-            <a:alpha val="80000"/>
-          </a:srgbClr>
+          <a:srgbClr val="E7E6E5"/>
         </a:solidFill>
         <a:effectLst/>
       </p:bgPr>
@@ -3235,86 +5896,6 @@
       </p:grpSpPr>
       <p:sp>
         <p:nvSpPr>
-          <p:cNvPr id="2" name="Title 1">
-            <a:extLst>
-              <a:ext uri="{FF2B5EF4-FFF2-40B4-BE49-F238E27FC236}">
-                <a16:creationId xmlns:a16="http://schemas.microsoft.com/office/drawing/2014/main" id="{1B9E2AF9-A1BC-4207-0793-405EBD931B35}"/>
-              </a:ext>
-            </a:extLst>
-          </p:cNvPr>
-          <p:cNvSpPr>
-            <a:spLocks noGrp="1"/>
-          </p:cNvSpPr>
-          <p:nvPr>
-            <p:ph type="title"/>
-          </p:nvPr>
-        </p:nvSpPr>
-        <p:spPr/>
-        <p:txBody>
-          <a:bodyPr/>
-          <a:lstStyle/>
-          <a:p>
-            <a:endParaRPr lang="de-DE"/>
-          </a:p>
-        </p:txBody>
-      </p:sp>
-      <p:sp>
-        <p:nvSpPr>
-          <p:cNvPr id="3" name="Vertical Text Placeholder 2">
-            <a:extLst>
-              <a:ext uri="{FF2B5EF4-FFF2-40B4-BE49-F238E27FC236}">
-                <a16:creationId xmlns:a16="http://schemas.microsoft.com/office/drawing/2014/main" id="{AA350C5A-1BA9-377F-D23E-3E27D1F7935C}"/>
-              </a:ext>
-            </a:extLst>
-          </p:cNvPr>
-          <p:cNvSpPr>
-            <a:spLocks noGrp="1"/>
-          </p:cNvSpPr>
-          <p:nvPr>
-            <p:ph type="body" orient="vert" idx="1"/>
-          </p:nvPr>
-        </p:nvSpPr>
-        <p:spPr/>
-        <p:txBody>
-          <a:bodyPr/>
-          <a:lstStyle/>
-          <a:p>
-            <a:endParaRPr lang="de-DE"/>
-          </a:p>
-        </p:txBody>
-      </p:sp>
-    </p:spTree>
-    <p:extLst>
-      <p:ext uri="{BB962C8B-B14F-4D97-AF65-F5344CB8AC3E}">
-        <p14:creationId xmlns:p14="http://schemas.microsoft.com/office/powerpoint/2010/main" val="557702706"/>
-      </p:ext>
-    </p:extLst>
-  </p:cSld>
-  <p:clrMapOvr>
-    <a:masterClrMapping/>
-  </p:clrMapOvr>
-</p:sld>
-</file>
-
-<file path=ppt/slides/slide3.xml><?xml version="1.0" encoding="utf-8"?>
-<p:sld xmlns:a="http://schemas.openxmlformats.org/drawingml/2006/main" xmlns:r="http://schemas.openxmlformats.org/officeDocument/2006/relationships" xmlns:p="http://schemas.openxmlformats.org/presentationml/2006/main">
-  <p:cSld>
-    <p:spTree>
-      <p:nvGrpSpPr>
-        <p:cNvPr id="1" name=""/>
-        <p:cNvGrpSpPr/>
-        <p:nvPr/>
-      </p:nvGrpSpPr>
-      <p:grpSpPr>
-        <a:xfrm>
-          <a:off x="0" y="0"/>
-          <a:ext cx="0" cy="0"/>
-          <a:chOff x="0" y="0"/>
-          <a:chExt cx="0" cy="0"/>
-        </a:xfrm>
-      </p:grpSpPr>
-      <p:sp>
-        <p:nvSpPr>
           <p:cNvPr id="7" name="Rectangle 6">
             <a:extLst>
               <a:ext uri="{FF2B5EF4-FFF2-40B4-BE49-F238E27FC236}">
@@ -3335,7 +5916,7 @@
           </a:prstGeom>
           <a:solidFill>
             <a:srgbClr val="4D6673">
-              <a:alpha val="80000"/>
+              <a:alpha val="75000"/>
             </a:srgbClr>
           </a:solidFill>
           <a:ln>
@@ -4295,9 +6876,19 @@
 </p:sld>
 </file>
 
-<file path=ppt/slides/slide4.xml><?xml version="1.0" encoding="utf-8"?>
+<file path=ppt/slides/slide3.xml><?xml version="1.0" encoding="utf-8"?>
 <p:sld xmlns:a="http://schemas.openxmlformats.org/drawingml/2006/main" xmlns:r="http://schemas.openxmlformats.org/officeDocument/2006/relationships" xmlns:p="http://schemas.openxmlformats.org/presentationml/2006/main">
   <p:cSld>
+    <p:bg>
+      <p:bgPr>
+        <a:solidFill>
+          <a:srgbClr val="4D6673">
+            <a:alpha val="75000"/>
+          </a:srgbClr>
+        </a:solidFill>
+        <a:effectLst/>
+      </p:bgPr>
+    </p:bg>
     <p:spTree>
       <p:nvGrpSpPr>
         <p:cNvPr id="1" name=""/>
@@ -4314,6 +6905,989 @@
       </p:grpSpPr>
       <p:sp>
         <p:nvSpPr>
+          <p:cNvPr id="2" name="Title 1">
+            <a:extLst>
+              <a:ext uri="{FF2B5EF4-FFF2-40B4-BE49-F238E27FC236}">
+                <a16:creationId xmlns:a16="http://schemas.microsoft.com/office/drawing/2014/main" id="{1B9E2AF9-A1BC-4207-0793-405EBD931B35}"/>
+              </a:ext>
+            </a:extLst>
+          </p:cNvPr>
+          <p:cNvSpPr>
+            <a:spLocks noGrp="1"/>
+          </p:cNvSpPr>
+          <p:nvPr>
+            <p:ph type="title"/>
+          </p:nvPr>
+        </p:nvSpPr>
+        <p:spPr/>
+        <p:txBody>
+          <a:bodyPr>
+            <a:normAutofit/>
+          </a:bodyPr>
+          <a:lstStyle/>
+          <a:p>
+            <a:r>
+              <a:rPr lang="de-DE" sz="4800" spc="300" dirty="0">
+                <a:latin typeface="Courier New" panose="02070309020205020404" pitchFamily="49" charset="0"/>
+                <a:cs typeface="Courier New" panose="02070309020205020404" pitchFamily="49" charset="0"/>
+              </a:rPr>
+              <a:t>Approach </a:t>
+            </a:r>
+          </a:p>
+        </p:txBody>
+      </p:sp>
+      <p:sp>
+        <p:nvSpPr>
+          <p:cNvPr id="3" name="Vertical Text Placeholder 2">
+            <a:extLst>
+              <a:ext uri="{FF2B5EF4-FFF2-40B4-BE49-F238E27FC236}">
+                <a16:creationId xmlns:a16="http://schemas.microsoft.com/office/drawing/2014/main" id="{AA350C5A-1BA9-377F-D23E-3E27D1F7935C}"/>
+              </a:ext>
+            </a:extLst>
+          </p:cNvPr>
+          <p:cNvSpPr>
+            <a:spLocks noGrp="1"/>
+          </p:cNvSpPr>
+          <p:nvPr>
+            <p:ph type="body" orient="vert" idx="1"/>
+          </p:nvPr>
+        </p:nvSpPr>
+        <p:spPr/>
+        <p:txBody>
+          <a:bodyPr vert="horz"/>
+          <a:lstStyle/>
+          <a:p>
+            <a:r>
+              <a:rPr lang="de-DE" dirty="0" err="1"/>
+              <a:t>Predicts</a:t>
+            </a:r>
+            <a:r>
+              <a:rPr lang="de-DE" dirty="0"/>
+              <a:t> </a:t>
+            </a:r>
+            <a:r>
+              <a:rPr lang="de-DE" dirty="0" err="1"/>
+              <a:t>next</a:t>
+            </a:r>
+            <a:r>
+              <a:rPr lang="de-DE" dirty="0"/>
+              <a:t> </a:t>
+            </a:r>
+            <a:r>
+              <a:rPr lang="de-DE" dirty="0" err="1"/>
+              <a:t>word</a:t>
+            </a:r>
+            <a:endParaRPr lang="de-DE" dirty="0"/>
+          </a:p>
+          <a:p>
+            <a:endParaRPr lang="de-DE" dirty="0"/>
+          </a:p>
+          <a:p>
+            <a:r>
+              <a:rPr lang="de-DE" dirty="0" err="1"/>
+              <a:t>Based</a:t>
+            </a:r>
+            <a:r>
+              <a:rPr lang="de-DE" dirty="0"/>
+              <a:t> on a </a:t>
+            </a:r>
+            <a:r>
+              <a:rPr lang="de-DE" dirty="0" err="1"/>
+              <a:t>bidirectional</a:t>
+            </a:r>
+            <a:r>
+              <a:rPr lang="de-DE" dirty="0"/>
+              <a:t> LSTM-model</a:t>
+            </a:r>
+          </a:p>
+          <a:p>
+            <a:endParaRPr lang="de-DE" dirty="0"/>
+          </a:p>
+          <a:p>
+            <a:r>
+              <a:rPr lang="de-DE" dirty="0"/>
+              <a:t>Data: 100 </a:t>
+            </a:r>
+            <a:r>
+              <a:rPr lang="de-DE" dirty="0" err="1"/>
+              <a:t>poems</a:t>
+            </a:r>
+            <a:r>
+              <a:rPr lang="de-DE" dirty="0"/>
+              <a:t> </a:t>
+            </a:r>
+            <a:r>
+              <a:rPr lang="de-DE" dirty="0" err="1"/>
+              <a:t>from</a:t>
+            </a:r>
+            <a:r>
+              <a:rPr lang="de-DE" dirty="0"/>
+              <a:t> Mary Oliver </a:t>
+            </a:r>
+          </a:p>
+          <a:p>
+            <a:pPr marL="0" indent="0">
+              <a:buNone/>
+            </a:pPr>
+            <a:endParaRPr lang="de-DE" dirty="0"/>
+          </a:p>
+        </p:txBody>
+      </p:sp>
+      <p:pic>
+        <p:nvPicPr>
+          <p:cNvPr id="5" name="Picture 4" descr="A picture containing person, wall, indoor&#10;&#10;Description automatically generated">
+            <a:extLst>
+              <a:ext uri="{FF2B5EF4-FFF2-40B4-BE49-F238E27FC236}">
+                <a16:creationId xmlns:a16="http://schemas.microsoft.com/office/drawing/2014/main" id="{BDDA49ED-EF8F-54A7-155D-7EFC21512A95}"/>
+              </a:ext>
+            </a:extLst>
+          </p:cNvPr>
+          <p:cNvPicPr>
+            <a:picLocks noChangeAspect="1"/>
+          </p:cNvPicPr>
+          <p:nvPr/>
+        </p:nvPicPr>
+        <p:blipFill>
+          <a:blip r:embed="rId3">
+            <a:extLst>
+              <a:ext uri="{28A0092B-C50C-407E-A947-70E740481C1C}">
+                <a14:useLocalDpi xmlns:a14="http://schemas.microsoft.com/office/drawing/2010/main" val="0"/>
+              </a:ext>
+            </a:extLst>
+          </a:blip>
+          <a:stretch>
+            <a:fillRect/>
+          </a:stretch>
+        </p:blipFill>
+        <p:spPr>
+          <a:xfrm>
+            <a:off x="8320338" y="1449291"/>
+            <a:ext cx="2371725" cy="3810000"/>
+          </a:xfrm>
+          <a:prstGeom prst="rect">
+            <a:avLst/>
+          </a:prstGeom>
+        </p:spPr>
+      </p:pic>
+      <p:cxnSp>
+        <p:nvCxnSpPr>
+          <p:cNvPr id="6" name="Straight Connector 5">
+            <a:extLst>
+              <a:ext uri="{FF2B5EF4-FFF2-40B4-BE49-F238E27FC236}">
+                <a16:creationId xmlns:a16="http://schemas.microsoft.com/office/drawing/2014/main" id="{7EA84895-6E3F-8E1D-2E6C-1FFD4563A0FC}"/>
+              </a:ext>
+            </a:extLst>
+          </p:cNvPr>
+          <p:cNvCxnSpPr/>
+          <p:nvPr/>
+        </p:nvCxnSpPr>
+        <p:spPr>
+          <a:xfrm>
+            <a:off x="0" y="1449291"/>
+            <a:ext cx="6065134" cy="0"/>
+          </a:xfrm>
+          <a:prstGeom prst="line">
+            <a:avLst/>
+          </a:prstGeom>
+          <a:ln w="15875">
+            <a:solidFill>
+              <a:srgbClr val="B0ADAA"/>
+            </a:solidFill>
+          </a:ln>
+        </p:spPr>
+        <p:style>
+          <a:lnRef idx="1">
+            <a:schemeClr val="accent1"/>
+          </a:lnRef>
+          <a:fillRef idx="0">
+            <a:schemeClr val="accent1"/>
+          </a:fillRef>
+          <a:effectRef idx="0">
+            <a:schemeClr val="accent1"/>
+          </a:effectRef>
+          <a:fontRef idx="minor">
+            <a:schemeClr val="tx1"/>
+          </a:fontRef>
+        </p:style>
+      </p:cxnSp>
+      <p:sp>
+        <p:nvSpPr>
+          <p:cNvPr id="7" name="TextBox 6">
+            <a:extLst>
+              <a:ext uri="{FF2B5EF4-FFF2-40B4-BE49-F238E27FC236}">
+                <a16:creationId xmlns:a16="http://schemas.microsoft.com/office/drawing/2014/main" id="{93A8EDEF-7665-9317-2EAC-5EBED49D2F23}"/>
+              </a:ext>
+            </a:extLst>
+          </p:cNvPr>
+          <p:cNvSpPr txBox="1"/>
+          <p:nvPr/>
+        </p:nvSpPr>
+        <p:spPr>
+          <a:xfrm>
+            <a:off x="7836804" y="5259292"/>
+            <a:ext cx="2936838" cy="276999"/>
+          </a:xfrm>
+          <a:prstGeom prst="rect">
+            <a:avLst/>
+          </a:prstGeom>
+          <a:noFill/>
+        </p:spPr>
+        <p:txBody>
+          <a:bodyPr wrap="square" rtlCol="0">
+            <a:spAutoFit/>
+          </a:bodyPr>
+          <a:lstStyle/>
+          <a:p>
+            <a:pPr algn="r"/>
+            <a:r>
+              <a:rPr lang="de-DE" sz="1200" dirty="0"/>
+              <a:t>https://en.wikipedia.org/wiki/Mary_Oliver</a:t>
+            </a:r>
+          </a:p>
+        </p:txBody>
+      </p:sp>
+    </p:spTree>
+    <p:extLst>
+      <p:ext uri="{BB962C8B-B14F-4D97-AF65-F5344CB8AC3E}">
+        <p14:creationId xmlns:p14="http://schemas.microsoft.com/office/powerpoint/2010/main" val="557702706"/>
+      </p:ext>
+    </p:extLst>
+  </p:cSld>
+  <p:clrMapOvr>
+    <a:masterClrMapping/>
+  </p:clrMapOvr>
+</p:sld>
+</file>
+
+<file path=ppt/slides/slide4.xml><?xml version="1.0" encoding="utf-8"?>
+<p:sld xmlns:a="http://schemas.openxmlformats.org/drawingml/2006/main" xmlns:r="http://schemas.openxmlformats.org/officeDocument/2006/relationships" xmlns:p="http://schemas.openxmlformats.org/presentationml/2006/main" show="0">
+  <p:cSld>
+    <p:bg>
+      <p:bgPr>
+        <a:solidFill>
+          <a:srgbClr val="4D6673">
+            <a:alpha val="75000"/>
+          </a:srgbClr>
+        </a:solidFill>
+        <a:effectLst/>
+      </p:bgPr>
+    </p:bg>
+    <p:spTree>
+      <p:nvGrpSpPr>
+        <p:cNvPr id="1" name=""/>
+        <p:cNvGrpSpPr/>
+        <p:nvPr/>
+      </p:nvGrpSpPr>
+      <p:grpSpPr>
+        <a:xfrm>
+          <a:off x="0" y="0"/>
+          <a:ext cx="0" cy="0"/>
+          <a:chOff x="0" y="0"/>
+          <a:chExt cx="0" cy="0"/>
+        </a:xfrm>
+      </p:grpSpPr>
+      <p:sp>
+        <p:nvSpPr>
+          <p:cNvPr id="2" name="Title 1">
+            <a:extLst>
+              <a:ext uri="{FF2B5EF4-FFF2-40B4-BE49-F238E27FC236}">
+                <a16:creationId xmlns:a16="http://schemas.microsoft.com/office/drawing/2014/main" id="{1B9E2AF9-A1BC-4207-0793-405EBD931B35}"/>
+              </a:ext>
+            </a:extLst>
+          </p:cNvPr>
+          <p:cNvSpPr>
+            <a:spLocks noGrp="1"/>
+          </p:cNvSpPr>
+          <p:nvPr>
+            <p:ph type="title"/>
+          </p:nvPr>
+        </p:nvSpPr>
+        <p:spPr>
+          <a:xfrm>
+            <a:off x="1171687" y="827397"/>
+            <a:ext cx="3292736" cy="871359"/>
+          </a:xfrm>
+        </p:spPr>
+        <p:txBody>
+          <a:bodyPr>
+            <a:normAutofit/>
+          </a:bodyPr>
+          <a:lstStyle/>
+          <a:p>
+            <a:r>
+              <a:rPr lang="de-DE" sz="2400" b="1" spc="300" dirty="0">
+                <a:latin typeface="Courier New" panose="02070309020205020404" pitchFamily="49" charset="0"/>
+                <a:cs typeface="Courier New" panose="02070309020205020404" pitchFamily="49" charset="0"/>
+              </a:rPr>
+              <a:t>Model 1 </a:t>
+            </a:r>
+          </a:p>
+        </p:txBody>
+      </p:sp>
+      <p:pic>
+        <p:nvPicPr>
+          <p:cNvPr id="7" name="Picture 6" descr="Shape&#10;&#10;Description automatically generated with medium confidence">
+            <a:extLst>
+              <a:ext uri="{FF2B5EF4-FFF2-40B4-BE49-F238E27FC236}">
+                <a16:creationId xmlns:a16="http://schemas.microsoft.com/office/drawing/2014/main" id="{50DF115B-79AE-8EF4-E01C-551224655906}"/>
+              </a:ext>
+            </a:extLst>
+          </p:cNvPr>
+          <p:cNvPicPr>
+            <a:picLocks noChangeAspect="1"/>
+          </p:cNvPicPr>
+          <p:nvPr/>
+        </p:nvPicPr>
+        <p:blipFill>
+          <a:blip r:embed="rId2">
+            <a:extLst>
+              <a:ext uri="{28A0092B-C50C-407E-A947-70E740481C1C}">
+                <a14:useLocalDpi xmlns:a14="http://schemas.microsoft.com/office/drawing/2010/main" val="0"/>
+              </a:ext>
+            </a:extLst>
+          </a:blip>
+          <a:stretch>
+            <a:fillRect/>
+          </a:stretch>
+        </p:blipFill>
+        <p:spPr>
+          <a:xfrm>
+            <a:off x="581773" y="1698756"/>
+            <a:ext cx="4901587" cy="3326984"/>
+          </a:xfrm>
+          <a:prstGeom prst="rect">
+            <a:avLst/>
+          </a:prstGeom>
+        </p:spPr>
+      </p:pic>
+      <p:pic>
+        <p:nvPicPr>
+          <p:cNvPr id="9" name="Picture 8" descr="Chart, line chart&#10;&#10;Description automatically generated">
+            <a:extLst>
+              <a:ext uri="{FF2B5EF4-FFF2-40B4-BE49-F238E27FC236}">
+                <a16:creationId xmlns:a16="http://schemas.microsoft.com/office/drawing/2014/main" id="{983352CF-FD89-0518-D105-7C89D73F29E5}"/>
+              </a:ext>
+            </a:extLst>
+          </p:cNvPr>
+          <p:cNvPicPr>
+            <a:picLocks noChangeAspect="1"/>
+          </p:cNvPicPr>
+          <p:nvPr/>
+        </p:nvPicPr>
+        <p:blipFill>
+          <a:blip r:embed="rId3">
+            <a:extLst>
+              <a:ext uri="{28A0092B-C50C-407E-A947-70E740481C1C}">
+                <a14:useLocalDpi xmlns:a14="http://schemas.microsoft.com/office/drawing/2010/main" val="0"/>
+              </a:ext>
+            </a:extLst>
+          </a:blip>
+          <a:stretch>
+            <a:fillRect/>
+          </a:stretch>
+        </p:blipFill>
+        <p:spPr>
+          <a:xfrm>
+            <a:off x="6452213" y="1690688"/>
+            <a:ext cx="4901587" cy="3326984"/>
+          </a:xfrm>
+          <a:prstGeom prst="rect">
+            <a:avLst/>
+          </a:prstGeom>
+        </p:spPr>
+      </p:pic>
+      <p:sp>
+        <p:nvSpPr>
+          <p:cNvPr id="10" name="Title 1">
+            <a:extLst>
+              <a:ext uri="{FF2B5EF4-FFF2-40B4-BE49-F238E27FC236}">
+                <a16:creationId xmlns:a16="http://schemas.microsoft.com/office/drawing/2014/main" id="{0B640844-AD2B-DF32-537A-485337870FA0}"/>
+              </a:ext>
+            </a:extLst>
+          </p:cNvPr>
+          <p:cNvSpPr txBox="1">
+            <a:spLocks/>
+          </p:cNvSpPr>
+          <p:nvPr/>
+        </p:nvSpPr>
+        <p:spPr>
+          <a:xfrm>
+            <a:off x="7047141" y="829190"/>
+            <a:ext cx="3292736" cy="871359"/>
+          </a:xfrm>
+          <a:prstGeom prst="rect">
+            <a:avLst/>
+          </a:prstGeom>
+        </p:spPr>
+        <p:txBody>
+          <a:bodyPr vert="horz" lIns="91440" tIns="45720" rIns="91440" bIns="45720" rtlCol="0" anchor="ctr">
+            <a:normAutofit/>
+          </a:bodyPr>
+          <a:lstStyle>
+            <a:lvl1pPr algn="l" defTabSz="914400" rtl="0" eaLnBrk="1" latinLnBrk="0" hangingPunct="1">
+              <a:lnSpc>
+                <a:spcPct val="90000"/>
+              </a:lnSpc>
+              <a:spcBef>
+                <a:spcPct val="0"/>
+              </a:spcBef>
+              <a:buNone/>
+              <a:defRPr sz="4400" kern="1200">
+                <a:solidFill>
+                  <a:schemeClr val="tx1"/>
+                </a:solidFill>
+                <a:latin typeface="+mj-lt"/>
+                <a:ea typeface="+mj-ea"/>
+                <a:cs typeface="+mj-cs"/>
+              </a:defRPr>
+            </a:lvl1pPr>
+          </a:lstStyle>
+          <a:p>
+            <a:r>
+              <a:rPr lang="de-DE" sz="2400" b="1" spc="300" dirty="0">
+                <a:latin typeface="Courier New" panose="02070309020205020404" pitchFamily="49" charset="0"/>
+                <a:cs typeface="Courier New" panose="02070309020205020404" pitchFamily="49" charset="0"/>
+              </a:rPr>
+              <a:t>Model 2 </a:t>
+            </a:r>
+          </a:p>
+        </p:txBody>
+      </p:sp>
+      <p:sp>
+        <p:nvSpPr>
+          <p:cNvPr id="11" name="TextBox 10">
+            <a:extLst>
+              <a:ext uri="{FF2B5EF4-FFF2-40B4-BE49-F238E27FC236}">
+                <a16:creationId xmlns:a16="http://schemas.microsoft.com/office/drawing/2014/main" id="{2357C782-5A2C-828D-C3E1-676D3267FF80}"/>
+              </a:ext>
+            </a:extLst>
+          </p:cNvPr>
+          <p:cNvSpPr txBox="1"/>
+          <p:nvPr/>
+        </p:nvSpPr>
+        <p:spPr>
+          <a:xfrm>
+            <a:off x="1160929" y="5411096"/>
+            <a:ext cx="4418353" cy="369332"/>
+          </a:xfrm>
+          <a:prstGeom prst="rect">
+            <a:avLst/>
+          </a:prstGeom>
+          <a:noFill/>
+        </p:spPr>
+        <p:txBody>
+          <a:bodyPr wrap="square" rtlCol="0">
+            <a:spAutoFit/>
+          </a:bodyPr>
+          <a:lstStyle/>
+          <a:p>
+            <a:r>
+              <a:rPr lang="de-DE" b="1" dirty="0">
+                <a:latin typeface="Courier New" panose="02070309020205020404" pitchFamily="49" charset="0"/>
+                <a:cs typeface="Courier New" panose="02070309020205020404" pitchFamily="49" charset="0"/>
+              </a:rPr>
+              <a:t>1 LSTM </a:t>
+            </a:r>
+            <a:r>
+              <a:rPr lang="de-DE" b="1" dirty="0" err="1">
+                <a:latin typeface="Courier New" panose="02070309020205020404" pitchFamily="49" charset="0"/>
+                <a:cs typeface="Courier New" panose="02070309020205020404" pitchFamily="49" charset="0"/>
+              </a:rPr>
+              <a:t>layer</a:t>
+            </a:r>
+            <a:endParaRPr lang="de-DE" b="1" dirty="0">
+              <a:latin typeface="Courier New" panose="02070309020205020404" pitchFamily="49" charset="0"/>
+              <a:cs typeface="Courier New" panose="02070309020205020404" pitchFamily="49" charset="0"/>
+            </a:endParaRPr>
+          </a:p>
+        </p:txBody>
+      </p:sp>
+      <p:sp>
+        <p:nvSpPr>
+          <p:cNvPr id="13" name="TextBox 12">
+            <a:extLst>
+              <a:ext uri="{FF2B5EF4-FFF2-40B4-BE49-F238E27FC236}">
+                <a16:creationId xmlns:a16="http://schemas.microsoft.com/office/drawing/2014/main" id="{F0BAA70A-16FB-897E-D990-3447DB570ED2}"/>
+              </a:ext>
+            </a:extLst>
+          </p:cNvPr>
+          <p:cNvSpPr txBox="1"/>
+          <p:nvPr/>
+        </p:nvSpPr>
+        <p:spPr>
+          <a:xfrm>
+            <a:off x="7057904" y="5412888"/>
+            <a:ext cx="4418353" cy="369332"/>
+          </a:xfrm>
+          <a:prstGeom prst="rect">
+            <a:avLst/>
+          </a:prstGeom>
+          <a:noFill/>
+        </p:spPr>
+        <p:txBody>
+          <a:bodyPr wrap="square" rtlCol="0">
+            <a:spAutoFit/>
+          </a:bodyPr>
+          <a:lstStyle/>
+          <a:p>
+            <a:r>
+              <a:rPr lang="de-DE" b="1" dirty="0">
+                <a:latin typeface="Courier New" panose="02070309020205020404" pitchFamily="49" charset="0"/>
+                <a:cs typeface="Courier New" panose="02070309020205020404" pitchFamily="49" charset="0"/>
+              </a:rPr>
+              <a:t>2 LSTM </a:t>
+            </a:r>
+            <a:r>
+              <a:rPr lang="de-DE" b="1" dirty="0" err="1">
+                <a:latin typeface="Courier New" panose="02070309020205020404" pitchFamily="49" charset="0"/>
+                <a:cs typeface="Courier New" panose="02070309020205020404" pitchFamily="49" charset="0"/>
+              </a:rPr>
+              <a:t>layer</a:t>
+            </a:r>
+            <a:r>
+              <a:rPr lang="de-DE" b="1" dirty="0">
+                <a:latin typeface="Courier New" panose="02070309020205020404" pitchFamily="49" charset="0"/>
+                <a:cs typeface="Courier New" panose="02070309020205020404" pitchFamily="49" charset="0"/>
+              </a:rPr>
+              <a:t> + </a:t>
+            </a:r>
+            <a:r>
+              <a:rPr lang="de-DE" b="1" dirty="0" err="1">
+                <a:latin typeface="Courier New" panose="02070309020205020404" pitchFamily="49" charset="0"/>
+                <a:cs typeface="Courier New" panose="02070309020205020404" pitchFamily="49" charset="0"/>
+              </a:rPr>
+              <a:t>dropout</a:t>
+            </a:r>
+            <a:r>
+              <a:rPr lang="de-DE" b="1" dirty="0">
+                <a:latin typeface="Courier New" panose="02070309020205020404" pitchFamily="49" charset="0"/>
+                <a:cs typeface="Courier New" panose="02070309020205020404" pitchFamily="49" charset="0"/>
+              </a:rPr>
+              <a:t> </a:t>
+            </a:r>
+            <a:r>
+              <a:rPr lang="de-DE" b="1" dirty="0" err="1">
+                <a:latin typeface="Courier New" panose="02070309020205020404" pitchFamily="49" charset="0"/>
+                <a:cs typeface="Courier New" panose="02070309020205020404" pitchFamily="49" charset="0"/>
+              </a:rPr>
+              <a:t>layer</a:t>
+            </a:r>
+            <a:endParaRPr lang="de-DE" b="1" dirty="0">
+              <a:latin typeface="Courier New" panose="02070309020205020404" pitchFamily="49" charset="0"/>
+              <a:cs typeface="Courier New" panose="02070309020205020404" pitchFamily="49" charset="0"/>
+            </a:endParaRPr>
+          </a:p>
+        </p:txBody>
+      </p:sp>
+      <p:cxnSp>
+        <p:nvCxnSpPr>
+          <p:cNvPr id="20" name="Straight Connector 19">
+            <a:extLst>
+              <a:ext uri="{FF2B5EF4-FFF2-40B4-BE49-F238E27FC236}">
+                <a16:creationId xmlns:a16="http://schemas.microsoft.com/office/drawing/2014/main" id="{ACAC7A0F-BD7E-447F-BBD5-28EC544281D9}"/>
+              </a:ext>
+            </a:extLst>
+          </p:cNvPr>
+          <p:cNvCxnSpPr>
+            <a:cxnSpLocks/>
+          </p:cNvCxnSpPr>
+          <p:nvPr/>
+        </p:nvCxnSpPr>
+        <p:spPr>
+          <a:xfrm>
+            <a:off x="6096000" y="830182"/>
+            <a:ext cx="0" cy="3918835"/>
+          </a:xfrm>
+          <a:prstGeom prst="line">
+            <a:avLst/>
+          </a:prstGeom>
+          <a:ln>
+            <a:solidFill>
+              <a:srgbClr val="B0ADAA"/>
+            </a:solidFill>
+          </a:ln>
+        </p:spPr>
+        <p:style>
+          <a:lnRef idx="1">
+            <a:schemeClr val="accent1"/>
+          </a:lnRef>
+          <a:fillRef idx="0">
+            <a:schemeClr val="accent1"/>
+          </a:fillRef>
+          <a:effectRef idx="0">
+            <a:schemeClr val="accent1"/>
+          </a:effectRef>
+          <a:fontRef idx="minor">
+            <a:schemeClr val="tx1"/>
+          </a:fontRef>
+        </p:style>
+      </p:cxnSp>
+    </p:spTree>
+    <p:extLst>
+      <p:ext uri="{BB962C8B-B14F-4D97-AF65-F5344CB8AC3E}">
+        <p14:creationId xmlns:p14="http://schemas.microsoft.com/office/powerpoint/2010/main" val="2786605157"/>
+      </p:ext>
+    </p:extLst>
+  </p:cSld>
+  <p:clrMapOvr>
+    <a:masterClrMapping/>
+  </p:clrMapOvr>
+</p:sld>
+</file>
+
+<file path=ppt/slides/slide5.xml><?xml version="1.0" encoding="utf-8"?>
+<p:sld xmlns:a="http://schemas.openxmlformats.org/drawingml/2006/main" xmlns:r="http://schemas.openxmlformats.org/officeDocument/2006/relationships" xmlns:p="http://schemas.openxmlformats.org/presentationml/2006/main">
+  <p:cSld>
+    <p:bg>
+      <p:bgPr>
+        <a:solidFill>
+          <a:srgbClr val="4D6673">
+            <a:alpha val="75000"/>
+          </a:srgbClr>
+        </a:solidFill>
+        <a:effectLst/>
+      </p:bgPr>
+    </p:bg>
+    <p:spTree>
+      <p:nvGrpSpPr>
+        <p:cNvPr id="1" name=""/>
+        <p:cNvGrpSpPr/>
+        <p:nvPr/>
+      </p:nvGrpSpPr>
+      <p:grpSpPr>
+        <a:xfrm>
+          <a:off x="0" y="0"/>
+          <a:ext cx="0" cy="0"/>
+          <a:chOff x="0" y="0"/>
+          <a:chExt cx="0" cy="0"/>
+        </a:xfrm>
+      </p:grpSpPr>
+      <p:sp>
+        <p:nvSpPr>
+          <p:cNvPr id="2" name="Title 1">
+            <a:extLst>
+              <a:ext uri="{FF2B5EF4-FFF2-40B4-BE49-F238E27FC236}">
+                <a16:creationId xmlns:a16="http://schemas.microsoft.com/office/drawing/2014/main" id="{1B9E2AF9-A1BC-4207-0793-405EBD931B35}"/>
+              </a:ext>
+            </a:extLst>
+          </p:cNvPr>
+          <p:cNvSpPr>
+            <a:spLocks noGrp="1"/>
+          </p:cNvSpPr>
+          <p:nvPr>
+            <p:ph type="title"/>
+          </p:nvPr>
+        </p:nvSpPr>
+        <p:spPr/>
+        <p:txBody>
+          <a:bodyPr>
+            <a:normAutofit/>
+          </a:bodyPr>
+          <a:lstStyle/>
+          <a:p>
+            <a:r>
+              <a:rPr lang="de-DE" sz="4800" spc="300" dirty="0">
+                <a:latin typeface="Courier New" panose="02070309020205020404" pitchFamily="49" charset="0"/>
+                <a:cs typeface="Courier New" panose="02070309020205020404" pitchFamily="49" charset="0"/>
+              </a:rPr>
+              <a:t>Problems - </a:t>
+            </a:r>
+            <a:r>
+              <a:rPr lang="de-DE" sz="4800" spc="300" dirty="0" err="1">
+                <a:latin typeface="Courier New" panose="02070309020205020404" pitchFamily="49" charset="0"/>
+                <a:cs typeface="Courier New" panose="02070309020205020404" pitchFamily="49" charset="0"/>
+              </a:rPr>
+              <a:t>Improvements</a:t>
+            </a:r>
+            <a:r>
+              <a:rPr lang="de-DE" sz="4800" spc="300" dirty="0">
+                <a:latin typeface="Courier New" panose="02070309020205020404" pitchFamily="49" charset="0"/>
+                <a:cs typeface="Courier New" panose="02070309020205020404" pitchFamily="49" charset="0"/>
+              </a:rPr>
+              <a:t> </a:t>
+            </a:r>
+          </a:p>
+        </p:txBody>
+      </p:sp>
+      <p:sp>
+        <p:nvSpPr>
+          <p:cNvPr id="3" name="Vertical Text Placeholder 2">
+            <a:extLst>
+              <a:ext uri="{FF2B5EF4-FFF2-40B4-BE49-F238E27FC236}">
+                <a16:creationId xmlns:a16="http://schemas.microsoft.com/office/drawing/2014/main" id="{AA350C5A-1BA9-377F-D23E-3E27D1F7935C}"/>
+              </a:ext>
+            </a:extLst>
+          </p:cNvPr>
+          <p:cNvSpPr>
+            <a:spLocks noGrp="1"/>
+          </p:cNvSpPr>
+          <p:nvPr>
+            <p:ph type="body" orient="vert" idx="1"/>
+          </p:nvPr>
+        </p:nvSpPr>
+        <p:spPr/>
+        <p:txBody>
+          <a:bodyPr vert="horz"/>
+          <a:lstStyle/>
+          <a:p>
+            <a:r>
+              <a:rPr lang="de-DE" dirty="0"/>
+              <a:t>Same </a:t>
+            </a:r>
+            <a:r>
+              <a:rPr lang="de-DE" dirty="0" err="1"/>
+              <a:t>sequence</a:t>
+            </a:r>
+            <a:r>
+              <a:rPr lang="de-DE" dirty="0"/>
+              <a:t> </a:t>
+            </a:r>
+            <a:r>
+              <a:rPr lang="de-DE" dirty="0" err="1"/>
+              <a:t>over</a:t>
+            </a:r>
+            <a:r>
+              <a:rPr lang="de-DE" dirty="0"/>
+              <a:t> and </a:t>
+            </a:r>
+            <a:r>
+              <a:rPr lang="de-DE" dirty="0" err="1"/>
+              <a:t>over</a:t>
+            </a:r>
+            <a:r>
+              <a:rPr lang="de-DE" dirty="0"/>
+              <a:t> </a:t>
+            </a:r>
+            <a:r>
+              <a:rPr lang="de-DE" dirty="0" err="1"/>
+              <a:t>again</a:t>
+            </a:r>
+            <a:r>
+              <a:rPr lang="de-DE" dirty="0"/>
+              <a:t>:</a:t>
+            </a:r>
+          </a:p>
+          <a:p>
+            <a:pPr marL="457200" lvl="1" indent="0">
+              <a:buNone/>
+            </a:pPr>
+            <a:r>
+              <a:rPr lang="de-DE" dirty="0">
+                <a:latin typeface="Courier New" panose="02070309020205020404" pitchFamily="49" charset="0"/>
+                <a:cs typeface="Courier New" panose="02070309020205020404" pitchFamily="49" charset="0"/>
+              </a:rPr>
+              <a:t>‚break </a:t>
+            </a:r>
+            <a:r>
+              <a:rPr lang="de-DE" dirty="0" err="1">
+                <a:latin typeface="Courier New" panose="02070309020205020404" pitchFamily="49" charset="0"/>
+                <a:cs typeface="Courier New" panose="02070309020205020404" pitchFamily="49" charset="0"/>
+              </a:rPr>
+              <a:t>wherever</a:t>
+            </a:r>
+            <a:r>
+              <a:rPr lang="de-DE" dirty="0">
+                <a:latin typeface="Courier New" panose="02070309020205020404" pitchFamily="49" charset="0"/>
+                <a:cs typeface="Courier New" panose="02070309020205020404" pitchFamily="49" charset="0"/>
+              </a:rPr>
+              <a:t> </a:t>
+            </a:r>
+            <a:r>
+              <a:rPr lang="de-DE" dirty="0" err="1">
+                <a:latin typeface="Courier New" panose="02070309020205020404" pitchFamily="49" charset="0"/>
+                <a:cs typeface="Courier New" panose="02070309020205020404" pitchFamily="49" charset="0"/>
+              </a:rPr>
+              <a:t>it</a:t>
+            </a:r>
+            <a:r>
+              <a:rPr lang="de-DE" dirty="0">
+                <a:latin typeface="Courier New" panose="02070309020205020404" pitchFamily="49" charset="0"/>
+                <a:cs typeface="Courier New" panose="02070309020205020404" pitchFamily="49" charset="0"/>
+              </a:rPr>
+              <a:t> was‘</a:t>
+            </a:r>
+          </a:p>
+          <a:p>
+            <a:endParaRPr lang="de-DE" dirty="0"/>
+          </a:p>
+          <a:p>
+            <a:r>
+              <a:rPr lang="de-DE" dirty="0" err="1"/>
+              <a:t>Interprets</a:t>
+            </a:r>
+            <a:r>
+              <a:rPr lang="de-DE" dirty="0"/>
+              <a:t> </a:t>
+            </a:r>
+            <a:r>
+              <a:rPr lang="de-DE" dirty="0">
+                <a:latin typeface="Courier New" panose="02070309020205020404" pitchFamily="49" charset="0"/>
+                <a:cs typeface="Courier New" panose="02070309020205020404" pitchFamily="49" charset="0"/>
+              </a:rPr>
+              <a:t>‚</a:t>
+            </a:r>
+            <a:r>
+              <a:rPr lang="de-DE" dirty="0" err="1">
+                <a:latin typeface="Courier New" panose="02070309020205020404" pitchFamily="49" charset="0"/>
+                <a:cs typeface="Courier New" panose="02070309020205020404" pitchFamily="49" charset="0"/>
+              </a:rPr>
+              <a:t>s‘</a:t>
+            </a:r>
+            <a:r>
+              <a:rPr lang="de-DE" dirty="0">
+                <a:latin typeface="Courier New" panose="02070309020205020404" pitchFamily="49" charset="0"/>
+                <a:cs typeface="Courier New" panose="02070309020205020404" pitchFamily="49" charset="0"/>
+              </a:rPr>
+              <a:t> </a:t>
+            </a:r>
+            <a:r>
+              <a:rPr lang="de-DE" dirty="0" err="1">
+                <a:cs typeface="Courier New" panose="02070309020205020404" pitchFamily="49" charset="0"/>
+              </a:rPr>
+              <a:t>or</a:t>
+            </a:r>
+            <a:r>
+              <a:rPr lang="de-DE" dirty="0">
+                <a:latin typeface="Courier New" panose="02070309020205020404" pitchFamily="49" charset="0"/>
+                <a:cs typeface="Courier New" panose="02070309020205020404" pitchFamily="49" charset="0"/>
+              </a:rPr>
+              <a:t> ‚t‘ </a:t>
+            </a:r>
+            <a:r>
+              <a:rPr lang="de-DE" dirty="0" err="1">
+                <a:cs typeface="Courier New" panose="02070309020205020404" pitchFamily="49" charset="0"/>
+              </a:rPr>
+              <a:t>as</a:t>
+            </a:r>
+            <a:r>
+              <a:rPr lang="de-DE" dirty="0">
+                <a:cs typeface="Courier New" panose="02070309020205020404" pitchFamily="49" charset="0"/>
+              </a:rPr>
+              <a:t> a </a:t>
+            </a:r>
+            <a:r>
+              <a:rPr lang="de-DE" dirty="0" err="1">
+                <a:cs typeface="Courier New" panose="02070309020205020404" pitchFamily="49" charset="0"/>
+              </a:rPr>
+              <a:t>word</a:t>
+            </a:r>
+            <a:r>
+              <a:rPr lang="de-DE" dirty="0">
+                <a:cs typeface="Courier New" panose="02070309020205020404" pitchFamily="49" charset="0"/>
+              </a:rPr>
+              <a:t> </a:t>
+            </a:r>
+            <a:endParaRPr lang="de-DE" dirty="0"/>
+          </a:p>
+          <a:p>
+            <a:endParaRPr lang="de-DE" dirty="0"/>
+          </a:p>
+          <a:p>
+            <a:r>
+              <a:rPr lang="de-DE" dirty="0" err="1"/>
+              <a:t>Doesn‘t</a:t>
+            </a:r>
+            <a:r>
+              <a:rPr lang="de-DE" dirty="0"/>
+              <a:t> </a:t>
+            </a:r>
+            <a:r>
+              <a:rPr lang="de-DE" dirty="0" err="1"/>
+              <a:t>know</a:t>
+            </a:r>
+            <a:r>
+              <a:rPr lang="de-DE" dirty="0"/>
+              <a:t> </a:t>
+            </a:r>
+            <a:r>
+              <a:rPr lang="de-DE" dirty="0" err="1"/>
+              <a:t>sentences</a:t>
+            </a:r>
+            <a:endParaRPr lang="de-DE" dirty="0"/>
+          </a:p>
+        </p:txBody>
+      </p:sp>
+      <p:cxnSp>
+        <p:nvCxnSpPr>
+          <p:cNvPr id="6" name="Straight Connector 5">
+            <a:extLst>
+              <a:ext uri="{FF2B5EF4-FFF2-40B4-BE49-F238E27FC236}">
+                <a16:creationId xmlns:a16="http://schemas.microsoft.com/office/drawing/2014/main" id="{7EA84895-6E3F-8E1D-2E6C-1FFD4563A0FC}"/>
+              </a:ext>
+            </a:extLst>
+          </p:cNvPr>
+          <p:cNvCxnSpPr/>
+          <p:nvPr/>
+        </p:nvCxnSpPr>
+        <p:spPr>
+          <a:xfrm>
+            <a:off x="0" y="1449291"/>
+            <a:ext cx="6065134" cy="0"/>
+          </a:xfrm>
+          <a:prstGeom prst="line">
+            <a:avLst/>
+          </a:prstGeom>
+          <a:ln w="15875">
+            <a:solidFill>
+              <a:srgbClr val="B0ADAA"/>
+            </a:solidFill>
+          </a:ln>
+        </p:spPr>
+        <p:style>
+          <a:lnRef idx="1">
+            <a:schemeClr val="accent1"/>
+          </a:lnRef>
+          <a:fillRef idx="0">
+            <a:schemeClr val="accent1"/>
+          </a:fillRef>
+          <a:effectRef idx="0">
+            <a:schemeClr val="accent1"/>
+          </a:effectRef>
+          <a:fontRef idx="minor">
+            <a:schemeClr val="tx1"/>
+          </a:fontRef>
+        </p:style>
+      </p:cxnSp>
+    </p:spTree>
+    <p:extLst>
+      <p:ext uri="{BB962C8B-B14F-4D97-AF65-F5344CB8AC3E}">
+        <p14:creationId xmlns:p14="http://schemas.microsoft.com/office/powerpoint/2010/main" val="4248562205"/>
+      </p:ext>
+    </p:extLst>
+  </p:cSld>
+  <p:clrMapOvr>
+    <a:masterClrMapping/>
+  </p:clrMapOvr>
+</p:sld>
+</file>
+
+<file path=ppt/slides/slide6.xml><?xml version="1.0" encoding="utf-8"?>
+<p:sld xmlns:a="http://schemas.openxmlformats.org/drawingml/2006/main" xmlns:r="http://schemas.openxmlformats.org/officeDocument/2006/relationships" xmlns:p="http://schemas.openxmlformats.org/presentationml/2006/main">
+  <p:cSld>
+    <p:bg>
+      <p:bgPr>
+        <a:solidFill>
+          <a:srgbClr val="E7E6E5"/>
+        </a:solidFill>
+        <a:effectLst/>
+      </p:bgPr>
+    </p:bg>
+    <p:spTree>
+      <p:nvGrpSpPr>
+        <p:cNvPr id="1" name=""/>
+        <p:cNvGrpSpPr/>
+        <p:nvPr/>
+      </p:nvGrpSpPr>
+      <p:grpSpPr>
+        <a:xfrm>
+          <a:off x="0" y="0"/>
+          <a:ext cx="0" cy="0"/>
+          <a:chOff x="0" y="0"/>
+          <a:chExt cx="0" cy="0"/>
+        </a:xfrm>
+      </p:grpSpPr>
+      <p:sp>
+        <p:nvSpPr>
           <p:cNvPr id="7" name="Rectangle 6">
             <a:extLst>
               <a:ext uri="{FF2B5EF4-FFF2-40B4-BE49-F238E27FC236}">
@@ -4334,7 +7908,7 @@
           </a:prstGeom>
           <a:solidFill>
             <a:srgbClr val="4D6673">
-              <a:alpha val="80000"/>
+              <a:alpha val="75000"/>
             </a:srgbClr>
           </a:solidFill>
           <a:ln>
@@ -4629,14 +8203,14 @@
 </p:sld>
 </file>
 
-<file path=ppt/slides/slide5.xml><?xml version="1.0" encoding="utf-8"?>
+<file path=ppt/slides/slide7.xml><?xml version="1.0" encoding="utf-8"?>
 <p:sld xmlns:a="http://schemas.openxmlformats.org/drawingml/2006/main" xmlns:r="http://schemas.openxmlformats.org/officeDocument/2006/relationships" xmlns:p="http://schemas.openxmlformats.org/presentationml/2006/main">
   <p:cSld>
     <p:bg>
       <p:bgPr>
         <a:solidFill>
           <a:srgbClr val="4D6673">
-            <a:alpha val="80000"/>
+            <a:alpha val="75000"/>
           </a:srgbClr>
         </a:solidFill>
         <a:effectLst/>
@@ -4656,6 +8230,120 @@
           <a:chExt cx="0" cy="0"/>
         </a:xfrm>
       </p:grpSpPr>
+      <p:sp>
+        <p:nvSpPr>
+          <p:cNvPr id="2" name="TextBox 1">
+            <a:extLst>
+              <a:ext uri="{FF2B5EF4-FFF2-40B4-BE49-F238E27FC236}">
+                <a16:creationId xmlns:a16="http://schemas.microsoft.com/office/drawing/2014/main" id="{2DD058A4-F011-9256-BC41-222836F5A62C}"/>
+              </a:ext>
+            </a:extLst>
+          </p:cNvPr>
+          <p:cNvSpPr txBox="1"/>
+          <p:nvPr/>
+        </p:nvSpPr>
+        <p:spPr>
+          <a:xfrm>
+            <a:off x="2752126" y="2137620"/>
+            <a:ext cx="1335779" cy="461665"/>
+          </a:xfrm>
+          <a:prstGeom prst="rect">
+            <a:avLst/>
+          </a:prstGeom>
+          <a:noFill/>
+        </p:spPr>
+        <p:txBody>
+          <a:bodyPr wrap="square" rtlCol="0">
+            <a:spAutoFit/>
+          </a:bodyPr>
+          <a:lstStyle/>
+          <a:p>
+            <a:r>
+              <a:rPr lang="de-DE" sz="2400" dirty="0">
+                <a:latin typeface="Courier New" panose="02070309020205020404" pitchFamily="49" charset="0"/>
+                <a:cs typeface="Courier New" panose="02070309020205020404" pitchFamily="49" charset="0"/>
+              </a:rPr>
+              <a:t>Any</a:t>
+            </a:r>
+          </a:p>
+        </p:txBody>
+      </p:sp>
+      <p:sp>
+        <p:nvSpPr>
+          <p:cNvPr id="3" name="TextBox 2">
+            <a:extLst>
+              <a:ext uri="{FF2B5EF4-FFF2-40B4-BE49-F238E27FC236}">
+                <a16:creationId xmlns:a16="http://schemas.microsoft.com/office/drawing/2014/main" id="{42715CF1-8DE4-6674-9613-21FF8790CC33}"/>
+              </a:ext>
+            </a:extLst>
+          </p:cNvPr>
+          <p:cNvSpPr txBox="1"/>
+          <p:nvPr/>
+        </p:nvSpPr>
+        <p:spPr>
+          <a:xfrm>
+            <a:off x="3537435" y="2137620"/>
+            <a:ext cx="3281082" cy="461665"/>
+          </a:xfrm>
+          <a:prstGeom prst="rect">
+            <a:avLst/>
+          </a:prstGeom>
+          <a:noFill/>
+        </p:spPr>
+        <p:txBody>
+          <a:bodyPr wrap="square" rtlCol="0">
+            <a:spAutoFit/>
+          </a:bodyPr>
+          <a:lstStyle/>
+          <a:p>
+            <a:r>
+              <a:rPr lang="de-DE" sz="2400" dirty="0">
+                <a:latin typeface="Courier New" panose="02070309020205020404" pitchFamily="49" charset="0"/>
+                <a:cs typeface="Courier New" panose="02070309020205020404" pitchFamily="49" charset="0"/>
+              </a:rPr>
+              <a:t>Questions</a:t>
+            </a:r>
+          </a:p>
+        </p:txBody>
+      </p:sp>
+      <p:sp>
+        <p:nvSpPr>
+          <p:cNvPr id="4" name="TextBox 3">
+            <a:extLst>
+              <a:ext uri="{FF2B5EF4-FFF2-40B4-BE49-F238E27FC236}">
+                <a16:creationId xmlns:a16="http://schemas.microsoft.com/office/drawing/2014/main" id="{6E1A43BE-FDC8-7494-37CE-D2A37297E860}"/>
+              </a:ext>
+            </a:extLst>
+          </p:cNvPr>
+          <p:cNvSpPr txBox="1"/>
+          <p:nvPr/>
+        </p:nvSpPr>
+        <p:spPr>
+          <a:xfrm>
+            <a:off x="5335793" y="2137620"/>
+            <a:ext cx="978946" cy="461665"/>
+          </a:xfrm>
+          <a:prstGeom prst="rect">
+            <a:avLst/>
+          </a:prstGeom>
+          <a:noFill/>
+        </p:spPr>
+        <p:txBody>
+          <a:bodyPr wrap="square" rtlCol="0">
+            <a:spAutoFit/>
+          </a:bodyPr>
+          <a:lstStyle/>
+          <a:p>
+            <a:r>
+              <a:rPr lang="de-DE" sz="2400" dirty="0">
+                <a:latin typeface="Courier New" panose="02070309020205020404" pitchFamily="49" charset="0"/>
+                <a:cs typeface="Courier New" panose="02070309020205020404" pitchFamily="49" charset="0"/>
+              </a:rPr>
+              <a:t>?</a:t>
+            </a:r>
+          </a:p>
+        </p:txBody>
+      </p:sp>
     </p:spTree>
     <p:extLst>
       <p:ext uri="{BB962C8B-B14F-4D97-AF65-F5344CB8AC3E}">
@@ -4666,6 +8354,158 @@
   <p:clrMapOvr>
     <a:masterClrMapping/>
   </p:clrMapOvr>
+  <p:timing>
+    <p:tnLst>
+      <p:par>
+        <p:cTn id="1" dur="indefinite" restart="never" nodeType="tmRoot">
+          <p:childTnLst>
+            <p:seq concurrent="1" nextAc="seek">
+              <p:cTn id="2" dur="indefinite" nodeType="mainSeq">
+                <p:childTnLst>
+                  <p:par>
+                    <p:cTn id="3" fill="hold">
+                      <p:stCondLst>
+                        <p:cond delay="indefinite"/>
+                      </p:stCondLst>
+                      <p:childTnLst>
+                        <p:par>
+                          <p:cTn id="4" fill="hold">
+                            <p:stCondLst>
+                              <p:cond delay="0"/>
+                            </p:stCondLst>
+                            <p:childTnLst>
+                              <p:par>
+                                <p:cTn id="5" presetID="1" presetClass="entr" presetSubtype="0" fill="hold" grpId="0" nodeType="clickEffect">
+                                  <p:stCondLst>
+                                    <p:cond delay="0"/>
+                                  </p:stCondLst>
+                                  <p:childTnLst>
+                                    <p:set>
+                                      <p:cBhvr>
+                                        <p:cTn id="6" dur="1" fill="hold">
+                                          <p:stCondLst>
+                                            <p:cond delay="0"/>
+                                          </p:stCondLst>
+                                        </p:cTn>
+                                        <p:tgtEl>
+                                          <p:spTgt spid="2"/>
+                                        </p:tgtEl>
+                                        <p:attrNameLst>
+                                          <p:attrName>style.visibility</p:attrName>
+                                        </p:attrNameLst>
+                                      </p:cBhvr>
+                                      <p:to>
+                                        <p:strVal val="visible"/>
+                                      </p:to>
+                                    </p:set>
+                                  </p:childTnLst>
+                                </p:cTn>
+                              </p:par>
+                            </p:childTnLst>
+                          </p:cTn>
+                        </p:par>
+                        <p:par>
+                          <p:cTn id="7" fill="hold">
+                            <p:stCondLst>
+                              <p:cond delay="0"/>
+                            </p:stCondLst>
+                            <p:childTnLst>
+                              <p:par>
+                                <p:cTn id="8" presetID="1" presetClass="entr" presetSubtype="0" fill="hold" grpId="0" nodeType="afterEffect">
+                                  <p:stCondLst>
+                                    <p:cond delay="250"/>
+                                  </p:stCondLst>
+                                  <p:childTnLst>
+                                    <p:set>
+                                      <p:cBhvr>
+                                        <p:cTn id="9" dur="1" fill="hold">
+                                          <p:stCondLst>
+                                            <p:cond delay="0"/>
+                                          </p:stCondLst>
+                                        </p:cTn>
+                                        <p:tgtEl>
+                                          <p:spTgt spid="3"/>
+                                        </p:tgtEl>
+                                        <p:attrNameLst>
+                                          <p:attrName>style.visibility</p:attrName>
+                                        </p:attrNameLst>
+                                      </p:cBhvr>
+                                      <p:to>
+                                        <p:strVal val="visible"/>
+                                      </p:to>
+                                    </p:set>
+                                  </p:childTnLst>
+                                </p:cTn>
+                              </p:par>
+                            </p:childTnLst>
+                          </p:cTn>
+                        </p:par>
+                        <p:par>
+                          <p:cTn id="10" fill="hold">
+                            <p:stCondLst>
+                              <p:cond delay="250"/>
+                            </p:stCondLst>
+                            <p:childTnLst>
+                              <p:par>
+                                <p:cTn id="11" presetID="1" presetClass="entr" presetSubtype="0" fill="hold" grpId="0" nodeType="afterEffect">
+                                  <p:stCondLst>
+                                    <p:cond delay="500"/>
+                                  </p:stCondLst>
+                                  <p:childTnLst>
+                                    <p:set>
+                                      <p:cBhvr>
+                                        <p:cTn id="12" dur="1" fill="hold">
+                                          <p:stCondLst>
+                                            <p:cond delay="0"/>
+                                          </p:stCondLst>
+                                        </p:cTn>
+                                        <p:tgtEl>
+                                          <p:spTgt spid="4"/>
+                                        </p:tgtEl>
+                                        <p:attrNameLst>
+                                          <p:attrName>style.visibility</p:attrName>
+                                        </p:attrNameLst>
+                                      </p:cBhvr>
+                                      <p:to>
+                                        <p:strVal val="visible"/>
+                                      </p:to>
+                                    </p:set>
+                                  </p:childTnLst>
+                                </p:cTn>
+                              </p:par>
+                            </p:childTnLst>
+                          </p:cTn>
+                        </p:par>
+                      </p:childTnLst>
+                    </p:cTn>
+                  </p:par>
+                </p:childTnLst>
+              </p:cTn>
+              <p:prevCondLst>
+                <p:cond evt="onPrev" delay="0">
+                  <p:tgtEl>
+                    <p:sldTgt/>
+                  </p:tgtEl>
+                </p:cond>
+              </p:prevCondLst>
+              <p:nextCondLst>
+                <p:cond evt="onNext" delay="0">
+                  <p:tgtEl>
+                    <p:sldTgt/>
+                  </p:tgtEl>
+                </p:cond>
+              </p:nextCondLst>
+            </p:seq>
+          </p:childTnLst>
+        </p:cTn>
+      </p:par>
+    </p:tnLst>
+    <p:bldLst>
+      <p:bldP spid="2" grpId="0"/>
+      <p:bldP spid="3" grpId="0"/>
+      <p:bldP spid="4" grpId="0"/>
+    </p:bldLst>
+  </p:timing>
 </p:sld>
 </file>
 
@@ -4928,4 +8768,299 @@
     </a:ext>
   </a:extLst>
 </a:theme>
+</file>
+
+<file path=ppt/theme/theme2.xml><?xml version="1.0" encoding="utf-8"?>
+<a:theme xmlns:a="http://schemas.openxmlformats.org/drawingml/2006/main" name="Office Theme">
+  <a:themeElements>
+    <a:clrScheme name="Office">
+      <a:dk1>
+        <a:sysClr val="windowText" lastClr="000000"/>
+      </a:dk1>
+      <a:lt1>
+        <a:sysClr val="window" lastClr="FFFFFF"/>
+      </a:lt1>
+      <a:dk2>
+        <a:srgbClr val="44546A"/>
+      </a:dk2>
+      <a:lt2>
+        <a:srgbClr val="E7E6E6"/>
+      </a:lt2>
+      <a:accent1>
+        <a:srgbClr val="4472C4"/>
+      </a:accent1>
+      <a:accent2>
+        <a:srgbClr val="ED7D31"/>
+      </a:accent2>
+      <a:accent3>
+        <a:srgbClr val="A5A5A5"/>
+      </a:accent3>
+      <a:accent4>
+        <a:srgbClr val="FFC000"/>
+      </a:accent4>
+      <a:accent5>
+        <a:srgbClr val="5B9BD5"/>
+      </a:accent5>
+      <a:accent6>
+        <a:srgbClr val="70AD47"/>
+      </a:accent6>
+      <a:hlink>
+        <a:srgbClr val="0563C1"/>
+      </a:hlink>
+      <a:folHlink>
+        <a:srgbClr val="954F72"/>
+      </a:folHlink>
+    </a:clrScheme>
+    <a:fontScheme name="Office">
+      <a:majorFont>
+        <a:latin typeface="Calibri Light" panose="020F0302020204030204"/>
+        <a:ea typeface=""/>
+        <a:cs typeface=""/>
+        <a:font script="Jpan" typeface="游ゴシック Light"/>
+        <a:font script="Hang" typeface="맑은 고딕"/>
+        <a:font script="Hans" typeface="等线 Light"/>
+        <a:font script="Hant" typeface="新細明體"/>
+        <a:font script="Arab" typeface="Times New Roman"/>
+        <a:font script="Hebr" typeface="Times New Roman"/>
+        <a:font script="Thai" typeface="Angsana New"/>
+        <a:font script="Ethi" typeface="Nyala"/>
+        <a:font script="Beng" typeface="Vrinda"/>
+        <a:font script="Gujr" typeface="Shruti"/>
+        <a:font script="Khmr" typeface="MoolBoran"/>
+        <a:font script="Knda" typeface="Tunga"/>
+        <a:font script="Guru" typeface="Raavi"/>
+        <a:font script="Cans" typeface="Euphemia"/>
+        <a:font script="Cher" typeface="Plantagenet Cherokee"/>
+        <a:font script="Yiii" typeface="Microsoft Yi Baiti"/>
+        <a:font script="Tibt" typeface="Microsoft Himalaya"/>
+        <a:font script="Thaa" typeface="MV Boli"/>
+        <a:font script="Deva" typeface="Mangal"/>
+        <a:font script="Telu" typeface="Gautami"/>
+        <a:font script="Taml" typeface="Latha"/>
+        <a:font script="Syrc" typeface="Estrangelo Edessa"/>
+        <a:font script="Orya" typeface="Kalinga"/>
+        <a:font script="Mlym" typeface="Kartika"/>
+        <a:font script="Laoo" typeface="DokChampa"/>
+        <a:font script="Sinh" typeface="Iskoola Pota"/>
+        <a:font script="Mong" typeface="Mongolian Baiti"/>
+        <a:font script="Viet" typeface="Times New Roman"/>
+        <a:font script="Uigh" typeface="Microsoft Uighur"/>
+        <a:font script="Geor" typeface="Sylfaen"/>
+        <a:font script="Armn" typeface="Arial"/>
+        <a:font script="Bugi" typeface="Leelawadee UI"/>
+        <a:font script="Bopo" typeface="Microsoft JhengHei"/>
+        <a:font script="Java" typeface="Javanese Text"/>
+        <a:font script="Lisu" typeface="Segoe UI"/>
+        <a:font script="Mymr" typeface="Myanmar Text"/>
+        <a:font script="Nkoo" typeface="Ebrima"/>
+        <a:font script="Olck" typeface="Nirmala UI"/>
+        <a:font script="Osma" typeface="Ebrima"/>
+        <a:font script="Phag" typeface="Phagspa"/>
+        <a:font script="Syrn" typeface="Estrangelo Edessa"/>
+        <a:font script="Syrj" typeface="Estrangelo Edessa"/>
+        <a:font script="Syre" typeface="Estrangelo Edessa"/>
+        <a:font script="Sora" typeface="Nirmala UI"/>
+        <a:font script="Tale" typeface="Microsoft Tai Le"/>
+        <a:font script="Talu" typeface="Microsoft New Tai Lue"/>
+        <a:font script="Tfng" typeface="Ebrima"/>
+      </a:majorFont>
+      <a:minorFont>
+        <a:latin typeface="Calibri" panose="020F0502020204030204"/>
+        <a:ea typeface=""/>
+        <a:cs typeface=""/>
+        <a:font script="Jpan" typeface="游ゴシック"/>
+        <a:font script="Hang" typeface="맑은 고딕"/>
+        <a:font script="Hans" typeface="等线"/>
+        <a:font script="Hant" typeface="新細明體"/>
+        <a:font script="Arab" typeface="Arial"/>
+        <a:font script="Hebr" typeface="Arial"/>
+        <a:font script="Thai" typeface="Cordia New"/>
+        <a:font script="Ethi" typeface="Nyala"/>
+        <a:font script="Beng" typeface="Vrinda"/>
+        <a:font script="Gujr" typeface="Shruti"/>
+        <a:font script="Khmr" typeface="DaunPenh"/>
+        <a:font script="Knda" typeface="Tunga"/>
+        <a:font script="Guru" typeface="Raavi"/>
+        <a:font script="Cans" typeface="Euphemia"/>
+        <a:font script="Cher" typeface="Plantagenet Cherokee"/>
+        <a:font script="Yiii" typeface="Microsoft Yi Baiti"/>
+        <a:font script="Tibt" typeface="Microsoft Himalaya"/>
+        <a:font script="Thaa" typeface="MV Boli"/>
+        <a:font script="Deva" typeface="Mangal"/>
+        <a:font script="Telu" typeface="Gautami"/>
+        <a:font script="Taml" typeface="Latha"/>
+        <a:font script="Syrc" typeface="Estrangelo Edessa"/>
+        <a:font script="Orya" typeface="Kalinga"/>
+        <a:font script="Mlym" typeface="Kartika"/>
+        <a:font script="Laoo" typeface="DokChampa"/>
+        <a:font script="Sinh" typeface="Iskoola Pota"/>
+        <a:font script="Mong" typeface="Mongolian Baiti"/>
+        <a:font script="Viet" typeface="Arial"/>
+        <a:font script="Uigh" typeface="Microsoft Uighur"/>
+        <a:font script="Geor" typeface="Sylfaen"/>
+        <a:font script="Armn" typeface="Arial"/>
+        <a:font script="Bugi" typeface="Leelawadee UI"/>
+        <a:font script="Bopo" typeface="Microsoft JhengHei"/>
+        <a:font script="Java" typeface="Javanese Text"/>
+        <a:font script="Lisu" typeface="Segoe UI"/>
+        <a:font script="Mymr" typeface="Myanmar Text"/>
+        <a:font script="Nkoo" typeface="Ebrima"/>
+        <a:font script="Olck" typeface="Nirmala UI"/>
+        <a:font script="Osma" typeface="Ebrima"/>
+        <a:font script="Phag" typeface="Phagspa"/>
+        <a:font script="Syrn" typeface="Estrangelo Edessa"/>
+        <a:font script="Syrj" typeface="Estrangelo Edessa"/>
+        <a:font script="Syre" typeface="Estrangelo Edessa"/>
+        <a:font script="Sora" typeface="Nirmala UI"/>
+        <a:font script="Tale" typeface="Microsoft Tai Le"/>
+        <a:font script="Talu" typeface="Microsoft New Tai Lue"/>
+        <a:font script="Tfng" typeface="Ebrima"/>
+      </a:minorFont>
+    </a:fontScheme>
+    <a:fmtScheme name="Office">
+      <a:fillStyleLst>
+        <a:solidFill>
+          <a:schemeClr val="phClr"/>
+        </a:solidFill>
+        <a:gradFill rotWithShape="1">
+          <a:gsLst>
+            <a:gs pos="0">
+              <a:schemeClr val="phClr">
+                <a:lumMod val="110000"/>
+                <a:satMod val="105000"/>
+                <a:tint val="67000"/>
+              </a:schemeClr>
+            </a:gs>
+            <a:gs pos="50000">
+              <a:schemeClr val="phClr">
+                <a:lumMod val="105000"/>
+                <a:satMod val="103000"/>
+                <a:tint val="73000"/>
+              </a:schemeClr>
+            </a:gs>
+            <a:gs pos="100000">
+              <a:schemeClr val="phClr">
+                <a:lumMod val="105000"/>
+                <a:satMod val="109000"/>
+                <a:tint val="81000"/>
+              </a:schemeClr>
+            </a:gs>
+          </a:gsLst>
+          <a:lin ang="5400000" scaled="0"/>
+        </a:gradFill>
+        <a:gradFill rotWithShape="1">
+          <a:gsLst>
+            <a:gs pos="0">
+              <a:schemeClr val="phClr">
+                <a:satMod val="103000"/>
+                <a:lumMod val="102000"/>
+                <a:tint val="94000"/>
+              </a:schemeClr>
+            </a:gs>
+            <a:gs pos="50000">
+              <a:schemeClr val="phClr">
+                <a:satMod val="110000"/>
+                <a:lumMod val="100000"/>
+                <a:shade val="100000"/>
+              </a:schemeClr>
+            </a:gs>
+            <a:gs pos="100000">
+              <a:schemeClr val="phClr">
+                <a:lumMod val="99000"/>
+                <a:satMod val="120000"/>
+                <a:shade val="78000"/>
+              </a:schemeClr>
+            </a:gs>
+          </a:gsLst>
+          <a:lin ang="5400000" scaled="0"/>
+        </a:gradFill>
+      </a:fillStyleLst>
+      <a:lnStyleLst>
+        <a:ln w="6350" cap="flat" cmpd="sng" algn="ctr">
+          <a:solidFill>
+            <a:schemeClr val="phClr"/>
+          </a:solidFill>
+          <a:prstDash val="solid"/>
+          <a:miter lim="800000"/>
+        </a:ln>
+        <a:ln w="12700" cap="flat" cmpd="sng" algn="ctr">
+          <a:solidFill>
+            <a:schemeClr val="phClr"/>
+          </a:solidFill>
+          <a:prstDash val="solid"/>
+          <a:miter lim="800000"/>
+        </a:ln>
+        <a:ln w="19050" cap="flat" cmpd="sng" algn="ctr">
+          <a:solidFill>
+            <a:schemeClr val="phClr"/>
+          </a:solidFill>
+          <a:prstDash val="solid"/>
+          <a:miter lim="800000"/>
+        </a:ln>
+      </a:lnStyleLst>
+      <a:effectStyleLst>
+        <a:effectStyle>
+          <a:effectLst/>
+        </a:effectStyle>
+        <a:effectStyle>
+          <a:effectLst/>
+        </a:effectStyle>
+        <a:effectStyle>
+          <a:effectLst>
+            <a:outerShdw blurRad="57150" dist="19050" dir="5400000" algn="ctr" rotWithShape="0">
+              <a:srgbClr val="000000">
+                <a:alpha val="63000"/>
+              </a:srgbClr>
+            </a:outerShdw>
+          </a:effectLst>
+        </a:effectStyle>
+      </a:effectStyleLst>
+      <a:bgFillStyleLst>
+        <a:solidFill>
+          <a:schemeClr val="phClr"/>
+        </a:solidFill>
+        <a:solidFill>
+          <a:schemeClr val="phClr">
+            <a:tint val="95000"/>
+            <a:satMod val="170000"/>
+          </a:schemeClr>
+        </a:solidFill>
+        <a:gradFill rotWithShape="1">
+          <a:gsLst>
+            <a:gs pos="0">
+              <a:schemeClr val="phClr">
+                <a:tint val="93000"/>
+                <a:satMod val="150000"/>
+                <a:shade val="98000"/>
+                <a:lumMod val="102000"/>
+              </a:schemeClr>
+            </a:gs>
+            <a:gs pos="50000">
+              <a:schemeClr val="phClr">
+                <a:tint val="98000"/>
+                <a:satMod val="130000"/>
+                <a:shade val="90000"/>
+                <a:lumMod val="103000"/>
+              </a:schemeClr>
+            </a:gs>
+            <a:gs pos="100000">
+              <a:schemeClr val="phClr">
+                <a:shade val="63000"/>
+                <a:satMod val="120000"/>
+              </a:schemeClr>
+            </a:gs>
+          </a:gsLst>
+          <a:lin ang="5400000" scaled="0"/>
+        </a:gradFill>
+      </a:bgFillStyleLst>
+    </a:fmtScheme>
+  </a:themeElements>
+  <a:objectDefaults/>
+  <a:extraClrSchemeLst/>
+  <a:extLst>
+    <a:ext uri="{05A4C25C-085E-4340-85A3-A5531E510DB2}">
+      <thm15:themeFamily xmlns:thm15="http://schemas.microsoft.com/office/thememl/2012/main" name="Office Theme" id="{62F939B6-93AF-4DB8-9C6B-D6C7DFDC589F}" vid="{4A3C46E8-61CC-4603-A589-7422A47A8E4A}"/>
+    </a:ext>
+  </a:extLst>
+</a:theme>
 </file>
</xml_diff>